<commit_message>
Incluída aula sobre fundamentos
</commit_message>
<xml_diff>
--- a/materiais/slides.pptx
+++ b/materiais/slides.pptx
@@ -5,7 +5,7 @@
     <p:sldMasterId id="2147483648" r:id="rId4"/>
   </p:sldMasterIdLst>
   <p:notesMasterIdLst>
-    <p:notesMasterId r:id="rId63"/>
+    <p:notesMasterId r:id="rId79"/>
   </p:notesMasterIdLst>
   <p:sldIdLst>
     <p:sldId id="256" r:id="rId5"/>
@@ -65,7 +65,23 @@
     <p:sldId id="465" r:id="rId59"/>
     <p:sldId id="466" r:id="rId60"/>
     <p:sldId id="467" r:id="rId61"/>
-    <p:sldId id="258" r:id="rId62"/>
+    <p:sldId id="483" r:id="rId62"/>
+    <p:sldId id="484" r:id="rId63"/>
+    <p:sldId id="485" r:id="rId64"/>
+    <p:sldId id="486" r:id="rId65"/>
+    <p:sldId id="487" r:id="rId66"/>
+    <p:sldId id="488" r:id="rId67"/>
+    <p:sldId id="489" r:id="rId68"/>
+    <p:sldId id="490" r:id="rId69"/>
+    <p:sldId id="491" r:id="rId70"/>
+    <p:sldId id="492" r:id="rId71"/>
+    <p:sldId id="493" r:id="rId72"/>
+    <p:sldId id="494" r:id="rId73"/>
+    <p:sldId id="495" r:id="rId74"/>
+    <p:sldId id="496" r:id="rId75"/>
+    <p:sldId id="497" r:id="rId76"/>
+    <p:sldId id="498" r:id="rId77"/>
+    <p:sldId id="258" r:id="rId78"/>
   </p:sldIdLst>
   <p:sldSz cx="24384000" cy="13716000"/>
   <p:notesSz cx="6858000" cy="9144000"/>
@@ -3511,7 +3527,7 @@
           </a:ln>
           <a:extLst>
             <a:ext uri="{C572A759-6A51-4108-AA02-DFA0A04FC94B}">
-              <ma14:wrappingTextBoxFlag xmlns="" xmlns:m="http://schemas.openxmlformats.org/officeDocument/2006/math" xmlns:a14="http://schemas.microsoft.com/office/drawing/2010/main" xmlns:ma14="http://schemas.microsoft.com/office/mac/drawingml/2011/main" val="1"/>
+              <ma14:wrappingTextBoxFlag xmlns:ma14="http://schemas.microsoft.com/office/mac/drawingml/2011/main" xmlns:a14="http://schemas.microsoft.com/office/drawing/2010/main" xmlns:m="http://schemas.openxmlformats.org/officeDocument/2006/math" xmlns="" val="1"/>
             </a:ext>
           </a:extLst>
         </p:spPr>
@@ -3550,7 +3566,7 @@
           </a:ln>
           <a:extLst>
             <a:ext uri="{C572A759-6A51-4108-AA02-DFA0A04FC94B}">
-              <ma14:wrappingTextBoxFlag xmlns="" xmlns:m="http://schemas.openxmlformats.org/officeDocument/2006/math" xmlns:a14="http://schemas.microsoft.com/office/drawing/2010/main" xmlns:ma14="http://schemas.microsoft.com/office/mac/drawingml/2011/main" val="1"/>
+              <ma14:wrappingTextBoxFlag xmlns:ma14="http://schemas.microsoft.com/office/mac/drawingml/2011/main" xmlns:a14="http://schemas.microsoft.com/office/drawing/2010/main" xmlns:m="http://schemas.openxmlformats.org/officeDocument/2006/math" xmlns="" val="1"/>
             </a:ext>
           </a:extLst>
         </p:spPr>
@@ -4520,7 +4536,7 @@
           </a:ln>
           <a:extLst>
             <a:ext uri="{C572A759-6A51-4108-AA02-DFA0A04FC94B}">
-              <ma14:wrappingTextBoxFlag xmlns="" xmlns:m="http://schemas.openxmlformats.org/officeDocument/2006/math" xmlns:a14="http://schemas.microsoft.com/office/drawing/2010/main" xmlns:ma14="http://schemas.microsoft.com/office/mac/drawingml/2011/main" val="1"/>
+              <ma14:wrappingTextBoxFlag xmlns:ma14="http://schemas.microsoft.com/office/mac/drawingml/2011/main" xmlns:a14="http://schemas.microsoft.com/office/drawing/2010/main" xmlns:m="http://schemas.openxmlformats.org/officeDocument/2006/math" xmlns="" val="1"/>
             </a:ext>
           </a:extLst>
         </p:spPr>
@@ -4896,7 +4912,7 @@
           </a:ln>
           <a:extLst>
             <a:ext uri="{C572A759-6A51-4108-AA02-DFA0A04FC94B}">
-              <ma14:wrappingTextBoxFlag xmlns="" xmlns:m="http://schemas.openxmlformats.org/officeDocument/2006/math" xmlns:a14="http://schemas.microsoft.com/office/drawing/2010/main" xmlns:ma14="http://schemas.microsoft.com/office/mac/drawingml/2011/main" val="1"/>
+              <ma14:wrappingTextBoxFlag xmlns:ma14="http://schemas.microsoft.com/office/mac/drawingml/2011/main" xmlns:a14="http://schemas.microsoft.com/office/drawing/2010/main" xmlns:m="http://schemas.openxmlformats.org/officeDocument/2006/math" xmlns="" val="1"/>
             </a:ext>
           </a:extLst>
         </p:spPr>
@@ -7186,6 +7202,32 @@
                 <a:hlinkClick r:id="rId4" action="ppaction://hlinksldjump"/>
               </a:rPr>
               <a:t>Git</a:t>
+            </a:r>
+            <a:endParaRPr lang="pt-BR" dirty="0"/>
+          </a:p>
+          <a:p>
+            <a:pPr marL="571500" indent="-571500">
+              <a:buFont typeface="Arial" panose="020B0604020202020204" pitchFamily="34" charset="0"/>
+              <a:buChar char="•"/>
+            </a:pPr>
+            <a:r>
+              <a:rPr lang="pt-BR" dirty="0">
+                <a:hlinkClick r:id="rId5" action="ppaction://hlinksldjump"/>
+              </a:rPr>
+              <a:t>Fundamentos da OO</a:t>
+            </a:r>
+            <a:endParaRPr lang="pt-BR" dirty="0"/>
+          </a:p>
+          <a:p>
+            <a:pPr marL="571500" indent="-571500">
+              <a:buFont typeface="Arial" panose="020B0604020202020204" pitchFamily="34" charset="0"/>
+              <a:buChar char="•"/>
+            </a:pPr>
+            <a:r>
+              <a:rPr lang="pt-BR" dirty="0">
+                <a:hlinkClick r:id="rId6" action="ppaction://hlinksldjump"/>
+              </a:rPr>
+              <a:t>Introdução a Java</a:t>
             </a:r>
             <a:endParaRPr lang="pt-BR" dirty="0"/>
           </a:p>
@@ -19792,48 +19834,96 @@
           <a:chExt cx="0" cy="0"/>
         </a:xfrm>
       </p:grpSpPr>
-      <p:pic>
-        <p:nvPicPr>
-          <p:cNvPr id="127" name="PPT_graduação_contracapa.png" descr="PPT_graduação_contracapa.png"/>
-          <p:cNvPicPr>
-            <a:picLocks noChangeAspect="1"/>
-          </p:cNvPicPr>
-          <p:nvPr/>
-        </p:nvPicPr>
-        <p:blipFill>
-          <a:blip r:embed="rId2"/>
-          <a:stretch>
-            <a:fillRect/>
-          </a:stretch>
-        </p:blipFill>
+      <p:sp>
+        <p:nvSpPr>
+          <p:cNvPr id="4" name="Título 3">
+            <a:extLst>
+              <a:ext uri="{FF2B5EF4-FFF2-40B4-BE49-F238E27FC236}">
+                <a16:creationId xmlns:a16="http://schemas.microsoft.com/office/drawing/2014/main" id="{4D95FF0F-F271-48E7-A204-C5656918B6A3}"/>
+              </a:ext>
+            </a:extLst>
+          </p:cNvPr>
+          <p:cNvSpPr>
+            <a:spLocks noGrp="1"/>
+          </p:cNvSpPr>
+          <p:nvPr>
+            <p:ph type="title"/>
+          </p:nvPr>
+        </p:nvSpPr>
         <p:spPr>
           <a:xfrm>
-            <a:off x="0" y="0"/>
-            <a:ext cx="24384000" cy="13716000"/>
+            <a:off x="1689100" y="4572000"/>
+            <a:ext cx="21005800" cy="2286000"/>
           </a:xfrm>
-          <a:prstGeom prst="rect">
-            <a:avLst/>
-          </a:prstGeom>
-          <a:ln w="12700">
-            <a:miter lim="400000"/>
-          </a:ln>
         </p:spPr>
-      </p:pic>
+        <p:txBody>
+          <a:bodyPr anchor="ctr">
+            <a:noAutofit/>
+          </a:bodyPr>
+          <a:lstStyle/>
+          <a:p>
+            <a:pPr algn="ctr"/>
+            <a:r>
+              <a:rPr lang="pt-BR" sz="10100" dirty="0"/>
+              <a:t>Fundamentos da Orientação a Objetos</a:t>
+            </a:r>
+          </a:p>
+        </p:txBody>
+      </p:sp>
       <p:sp>
         <p:nvSpPr>
-          <p:cNvPr id="3" name="CaixaDeTexto 2"/>
-          <p:cNvSpPr txBox="1"/>
+          <p:cNvPr id="3" name="Espaço Reservado para Número de Slide 2">
+            <a:extLst>
+              <a:ext uri="{FF2B5EF4-FFF2-40B4-BE49-F238E27FC236}">
+                <a16:creationId xmlns:a16="http://schemas.microsoft.com/office/drawing/2014/main" id="{0A64DBA4-BCFE-45E5-997E-0703CA3C03F1}"/>
+              </a:ext>
+            </a:extLst>
+          </p:cNvPr>
+          <p:cNvSpPr>
+            <a:spLocks noGrp="1"/>
+          </p:cNvSpPr>
+          <p:nvPr>
+            <p:ph type="sldNum" sz="quarter" idx="10"/>
+          </p:nvPr>
+        </p:nvSpPr>
+        <p:spPr/>
+        <p:txBody>
+          <a:bodyPr/>
+          <a:lstStyle/>
+          <a:p>
+            <a:fld id="{5D0C34D4-E406-4A74-B020-30BB69A49765}" type="slidenum">
+              <a:rPr lang="pt-BR" smtClean="0"/>
+              <a:pPr/>
+              <a:t>58</a:t>
+            </a:fld>
+            <a:endParaRPr lang="pt-BR" dirty="0"/>
+          </a:p>
+        </p:txBody>
+      </p:sp>
+      <p:sp>
+        <p:nvSpPr>
+          <p:cNvPr id="5" name="Seta: para a Esquerda 4">
+            <a:hlinkClick r:id="rId2" action="ppaction://hlinksldjump"/>
+            <a:extLst>
+              <a:ext uri="{FF2B5EF4-FFF2-40B4-BE49-F238E27FC236}">
+                <a16:creationId xmlns:a16="http://schemas.microsoft.com/office/drawing/2014/main" id="{FB1B9FE4-85B3-4444-8B9B-D63B0DA9614E}"/>
+              </a:ext>
+            </a:extLst>
+          </p:cNvPr>
+          <p:cNvSpPr/>
           <p:nvPr/>
         </p:nvSpPr>
         <p:spPr>
           <a:xfrm>
-            <a:off x="2160971" y="11172650"/>
-            <a:ext cx="5681043" cy="1456809"/>
+            <a:off x="1428508" y="522995"/>
+            <a:ext cx="938463" cy="986589"/>
           </a:xfrm>
-          <a:prstGeom prst="rect">
+          <a:prstGeom prst="leftArrow">
             <a:avLst/>
           </a:prstGeom>
-          <a:noFill/>
+          <a:solidFill>
+            <a:schemeClr val="accent1"/>
+          </a:solidFill>
           <a:ln w="12700" cap="flat">
             <a:noFill/>
             <a:miter lim="400000"/>
@@ -19854,7 +19944,7 @@
           <a:fontRef idx="none"/>
         </p:style>
         <p:txBody>
-          <a:bodyPr rot="0" spcFirstLastPara="1" vertOverflow="overflow" horzOverflow="overflow" vert="horz" wrap="none" lIns="50800" tIns="50800" rIns="50800" bIns="50800" numCol="1" spcCol="38100" rtlCol="0" anchor="ctr">
+          <a:bodyPr rot="0" spcFirstLastPara="1" vertOverflow="overflow" horzOverflow="overflow" vert="horz" wrap="square" lIns="0" tIns="0" rIns="0" bIns="0" numCol="1" spcCol="38100" rtlCol="0" anchor="ctr">
             <a:spAutoFit/>
           </a:bodyPr>
           <a:lstStyle/>
@@ -19875,28 +19965,319 @@
               <a:buNone/>
               <a:tabLst/>
             </a:pPr>
-            <a:r>
-              <a:rPr kumimoji="0" lang="pt-BR" sz="8800" b="1" i="0" u="none" strike="noStrike" cap="none" spc="0" normalizeH="0" baseline="0" dirty="0">
-                <a:ln>
-                  <a:noFill/>
-                </a:ln>
-                <a:solidFill>
-                  <a:schemeClr val="bg2">
-                    <a:lumMod val="50000"/>
-                  </a:schemeClr>
-                </a:solidFill>
-                <a:effectLst/>
-                <a:uFillTx/>
-                <a:latin typeface="Calibri" panose="020F0502020204030204" pitchFamily="34" charset="0"/>
-                <a:cs typeface="Calibri" panose="020F0502020204030204" pitchFamily="34" charset="0"/>
-                <a:sym typeface="Helvetica Neue"/>
-              </a:rPr>
-              <a:t>OBRIGADO!</a:t>
-            </a:r>
+            <a:endParaRPr kumimoji="0" lang="pt-BR" sz="3200" b="0" i="0" u="none" strike="noStrike" cap="none" spc="0" normalizeH="0" baseline="0">
+              <a:ln>
+                <a:noFill/>
+              </a:ln>
+              <a:solidFill>
+                <a:srgbClr val="FFFFFF"/>
+              </a:solidFill>
+              <a:effectLst/>
+              <a:uFillTx/>
+              <a:latin typeface="+mn-lt"/>
+              <a:ea typeface="+mn-ea"/>
+              <a:cs typeface="+mn-cs"/>
+              <a:sym typeface="Helvetica Neue Medium"/>
+            </a:endParaRPr>
           </a:p>
         </p:txBody>
       </p:sp>
     </p:spTree>
+    <p:extLst>
+      <p:ext uri="{BB962C8B-B14F-4D97-AF65-F5344CB8AC3E}">
+        <p14:creationId xmlns:p14="http://schemas.microsoft.com/office/powerpoint/2010/main" val="2904296895"/>
+      </p:ext>
+    </p:extLst>
+  </p:cSld>
+  <p:clrMapOvr>
+    <a:masterClrMapping/>
+  </p:clrMapOvr>
+  <p:transition spd="med"/>
+</p:sld>
+</file>
+
+<file path=ppt/slides/slide59.xml><?xml version="1.0" encoding="utf-8"?>
+<p:sld xmlns:a="http://schemas.openxmlformats.org/drawingml/2006/main" xmlns:r="http://schemas.openxmlformats.org/officeDocument/2006/relationships" xmlns:p="http://schemas.openxmlformats.org/presentationml/2006/main">
+  <p:cSld>
+    <p:spTree>
+      <p:nvGrpSpPr>
+        <p:cNvPr id="1" name=""/>
+        <p:cNvGrpSpPr/>
+        <p:nvPr/>
+      </p:nvGrpSpPr>
+      <p:grpSpPr>
+        <a:xfrm>
+          <a:off x="0" y="0"/>
+          <a:ext cx="0" cy="0"/>
+          <a:chOff x="0" y="0"/>
+          <a:chExt cx="0" cy="0"/>
+        </a:xfrm>
+      </p:grpSpPr>
+      <p:sp>
+        <p:nvSpPr>
+          <p:cNvPr id="4" name="Título 3">
+            <a:extLst>
+              <a:ext uri="{FF2B5EF4-FFF2-40B4-BE49-F238E27FC236}">
+                <a16:creationId xmlns:a16="http://schemas.microsoft.com/office/drawing/2014/main" id="{8A4C52A0-42D9-47BB-966A-7FE92FDBFA2D}"/>
+              </a:ext>
+            </a:extLst>
+          </p:cNvPr>
+          <p:cNvSpPr>
+            <a:spLocks noGrp="1"/>
+          </p:cNvSpPr>
+          <p:nvPr>
+            <p:ph type="title"/>
+          </p:nvPr>
+        </p:nvSpPr>
+        <p:spPr/>
+        <p:txBody>
+          <a:bodyPr>
+            <a:normAutofit/>
+          </a:bodyPr>
+          <a:lstStyle/>
+          <a:p>
+            <a:r>
+              <a:rPr lang="pt-BR" dirty="0"/>
+              <a:t>Por que usar OO?</a:t>
+            </a:r>
+          </a:p>
+        </p:txBody>
+      </p:sp>
+      <p:sp>
+        <p:nvSpPr>
+          <p:cNvPr id="5" name="Espaço Reservado para Conteúdo 4">
+            <a:extLst>
+              <a:ext uri="{FF2B5EF4-FFF2-40B4-BE49-F238E27FC236}">
+                <a16:creationId xmlns:a16="http://schemas.microsoft.com/office/drawing/2014/main" id="{1FBD8255-54D1-42B3-9B71-2D45D227E6FC}"/>
+              </a:ext>
+            </a:extLst>
+          </p:cNvPr>
+          <p:cNvSpPr>
+            <a:spLocks noGrp="1"/>
+          </p:cNvSpPr>
+          <p:nvPr>
+            <p:ph type="body" idx="1"/>
+          </p:nvPr>
+        </p:nvSpPr>
+        <p:spPr>
+          <a:xfrm>
+            <a:off x="1689100" y="2604530"/>
+            <a:ext cx="21005800" cy="10609446"/>
+          </a:xfrm>
+          <a:solidFill>
+            <a:schemeClr val="bg1"/>
+          </a:solidFill>
+        </p:spPr>
+        <p:txBody>
+          <a:bodyPr>
+            <a:noAutofit/>
+          </a:bodyPr>
+          <a:lstStyle/>
+          <a:p>
+            <a:pPr>
+              <a:buSzPct val="100000"/>
+            </a:pPr>
+            <a:r>
+              <a:rPr lang="pt-BR" sz="4000" dirty="0">
+                <a:cs typeface="Courier New" panose="02070309020205020404" pitchFamily="49" charset="0"/>
+              </a:rPr>
+              <a:t>Segundo o Paradigma Procedural, é possível representar todo e qualquer processo do mundo real a partir da utilização de </a:t>
+            </a:r>
+            <a:r>
+              <a:rPr lang="pt-BR" sz="4000" b="1" dirty="0">
+                <a:cs typeface="Courier New" panose="02070309020205020404" pitchFamily="49" charset="0"/>
+              </a:rPr>
+              <a:t>apenas</a:t>
+            </a:r>
+            <a:r>
+              <a:rPr lang="pt-BR" sz="4000" dirty="0">
+                <a:cs typeface="Courier New" panose="02070309020205020404" pitchFamily="49" charset="0"/>
+              </a:rPr>
+              <a:t> três estruturas básicas:</a:t>
+            </a:r>
+          </a:p>
+          <a:p>
+            <a:pPr marL="571500" indent="-571500">
+              <a:buSzPct val="100000"/>
+              <a:buFont typeface="Arial" panose="020B0604020202020204" pitchFamily="34" charset="0"/>
+              <a:buChar char="•"/>
+            </a:pPr>
+            <a:r>
+              <a:rPr lang="pt-BR" sz="4000" dirty="0">
+                <a:cs typeface="Courier New" panose="02070309020205020404" pitchFamily="49" charset="0"/>
+              </a:rPr>
+              <a:t>Sequência: Os passos devem ser executados um após o outro, linearmente. Ou seja, o programa seria uma sequência finita de passos. Em uma unidade de código, todos os passos devem ser feitos para se programar o algoritmo desejado;</a:t>
+            </a:r>
+          </a:p>
+          <a:p>
+            <a:pPr marL="571500" indent="-571500">
+              <a:buSzPct val="100000"/>
+              <a:buFont typeface="Arial" panose="020B0604020202020204" pitchFamily="34" charset="0"/>
+              <a:buChar char="•"/>
+            </a:pPr>
+            <a:r>
+              <a:rPr lang="pt-BR" sz="4000" dirty="0">
+                <a:cs typeface="Courier New" panose="02070309020205020404" pitchFamily="49" charset="0"/>
+              </a:rPr>
+              <a:t>Decisão: Uma determinada sequência de código pode ou não ser executada. Para isto, um teste lógico deve ser realizado para determinar ou não sua execução. A partir disto, verifica-se que duas estruturas de decisão (também conhecida como seleção) podem ser usadas: a </a:t>
+            </a:r>
+            <a:r>
+              <a:rPr lang="pt-BR" sz="3600" dirty="0" err="1">
+                <a:latin typeface="Verdana" panose="020B0604030504040204" pitchFamily="34" charset="0"/>
+                <a:ea typeface="Verdana" panose="020B0604030504040204" pitchFamily="34" charset="0"/>
+                <a:cs typeface="Courier New" panose="02070309020205020404" pitchFamily="49" charset="0"/>
+              </a:rPr>
+              <a:t>if-else</a:t>
+            </a:r>
+            <a:r>
+              <a:rPr lang="pt-BR" sz="4000" dirty="0">
+                <a:cs typeface="Courier New" panose="02070309020205020404" pitchFamily="49" charset="0"/>
+              </a:rPr>
+              <a:t> e a </a:t>
+            </a:r>
+            <a:r>
+              <a:rPr lang="pt-BR" sz="3600" dirty="0">
+                <a:latin typeface="Verdana" panose="020B0604030504040204" pitchFamily="34" charset="0"/>
+                <a:ea typeface="Verdana" panose="020B0604030504040204" pitchFamily="34" charset="0"/>
+                <a:cs typeface="Courier New" panose="02070309020205020404" pitchFamily="49" charset="0"/>
+              </a:rPr>
+              <a:t>switch</a:t>
+            </a:r>
+            <a:r>
+              <a:rPr lang="pt-BR" sz="4000" dirty="0">
+                <a:cs typeface="Courier New" panose="02070309020205020404" pitchFamily="49" charset="0"/>
+              </a:rPr>
+              <a:t>.</a:t>
+            </a:r>
+          </a:p>
+          <a:p>
+            <a:pPr marL="571500" indent="-571500">
+              <a:buSzPct val="100000"/>
+              <a:buFont typeface="Arial" panose="020B0604020202020204" pitchFamily="34" charset="0"/>
+              <a:buChar char="•"/>
+            </a:pPr>
+            <a:r>
+              <a:rPr lang="pt-BR" sz="4000" dirty="0">
+                <a:cs typeface="Courier New" panose="02070309020205020404" pitchFamily="49" charset="0"/>
+              </a:rPr>
+              <a:t>Iteração: É a execução repetitiva de um segmento (parte do programa). A partir da execução de um teste lógico, a repetição é realizada um número finito de vezes. Estruturas de repetição conhecidas são: </a:t>
+            </a:r>
+            <a:r>
+              <a:rPr lang="pt-BR" sz="3600" dirty="0">
+                <a:latin typeface="Verdana" panose="020B0604030504040204" pitchFamily="34" charset="0"/>
+                <a:ea typeface="Verdana" panose="020B0604030504040204" pitchFamily="34" charset="0"/>
+                <a:cs typeface="Courier New" panose="02070309020205020404" pitchFamily="49" charset="0"/>
+              </a:rPr>
+              <a:t>for</a:t>
+            </a:r>
+            <a:r>
+              <a:rPr lang="pt-BR" sz="4000" dirty="0">
+                <a:cs typeface="Courier New" panose="02070309020205020404" pitchFamily="49" charset="0"/>
+              </a:rPr>
+              <a:t>, </a:t>
+            </a:r>
+            <a:r>
+              <a:rPr lang="pt-BR" sz="3600" dirty="0" err="1">
+                <a:latin typeface="Verdana" panose="020B0604030504040204" pitchFamily="34" charset="0"/>
+                <a:ea typeface="Verdana" panose="020B0604030504040204" pitchFamily="34" charset="0"/>
+                <a:cs typeface="Courier New" panose="02070309020205020404" pitchFamily="49" charset="0"/>
+              </a:rPr>
+              <a:t>foreach</a:t>
+            </a:r>
+            <a:r>
+              <a:rPr lang="pt-BR" sz="4000" dirty="0">
+                <a:cs typeface="Courier New" panose="02070309020205020404" pitchFamily="49" charset="0"/>
+              </a:rPr>
+              <a:t>, </a:t>
+            </a:r>
+            <a:r>
+              <a:rPr lang="pt-BR" sz="3600" dirty="0" err="1">
+                <a:latin typeface="Verdana" panose="020B0604030504040204" pitchFamily="34" charset="0"/>
+                <a:ea typeface="Verdana" panose="020B0604030504040204" pitchFamily="34" charset="0"/>
+                <a:cs typeface="Courier New" panose="02070309020205020404" pitchFamily="49" charset="0"/>
+              </a:rPr>
+              <a:t>while</a:t>
+            </a:r>
+            <a:r>
+              <a:rPr lang="pt-BR" sz="4000" dirty="0">
+                <a:cs typeface="Courier New" panose="02070309020205020404" pitchFamily="49" charset="0"/>
+              </a:rPr>
+              <a:t>, </a:t>
+            </a:r>
+            <a:r>
+              <a:rPr lang="pt-BR" sz="3600" dirty="0">
+                <a:latin typeface="Verdana" panose="020B0604030504040204" pitchFamily="34" charset="0"/>
+                <a:ea typeface="Verdana" panose="020B0604030504040204" pitchFamily="34" charset="0"/>
+                <a:cs typeface="Courier New" panose="02070309020205020404" pitchFamily="49" charset="0"/>
+              </a:rPr>
+              <a:t>do-</a:t>
+            </a:r>
+            <a:r>
+              <a:rPr lang="pt-BR" sz="3600" dirty="0" err="1">
+                <a:latin typeface="Verdana" panose="020B0604030504040204" pitchFamily="34" charset="0"/>
+                <a:ea typeface="Verdana" panose="020B0604030504040204" pitchFamily="34" charset="0"/>
+                <a:cs typeface="Courier New" panose="02070309020205020404" pitchFamily="49" charset="0"/>
+              </a:rPr>
+              <a:t>while</a:t>
+            </a:r>
+            <a:r>
+              <a:rPr lang="pt-BR" sz="4000" dirty="0">
+                <a:cs typeface="Courier New" panose="02070309020205020404" pitchFamily="49" charset="0"/>
+              </a:rPr>
+              <a:t>, </a:t>
+            </a:r>
+            <a:r>
+              <a:rPr lang="pt-BR" sz="3600" dirty="0" err="1">
+                <a:latin typeface="Verdana" panose="020B0604030504040204" pitchFamily="34" charset="0"/>
+                <a:ea typeface="Verdana" panose="020B0604030504040204" pitchFamily="34" charset="0"/>
+                <a:cs typeface="Courier New" panose="02070309020205020404" pitchFamily="49" charset="0"/>
+              </a:rPr>
+              <a:t>repeat-until</a:t>
+            </a:r>
+            <a:r>
+              <a:rPr lang="pt-BR" sz="4000" dirty="0">
+                <a:cs typeface="Courier New" panose="02070309020205020404" pitchFamily="49" charset="0"/>
+              </a:rPr>
+              <a:t>, entre outras (dependendo da linguagem de programação).</a:t>
+            </a:r>
+          </a:p>
+        </p:txBody>
+      </p:sp>
+      <p:sp>
+        <p:nvSpPr>
+          <p:cNvPr id="7" name="Espaço Reservado para Número de Slide 6">
+            <a:extLst>
+              <a:ext uri="{FF2B5EF4-FFF2-40B4-BE49-F238E27FC236}">
+                <a16:creationId xmlns:a16="http://schemas.microsoft.com/office/drawing/2014/main" id="{40C5ECBA-0615-433C-B308-162C7F749201}"/>
+              </a:ext>
+            </a:extLst>
+          </p:cNvPr>
+          <p:cNvSpPr>
+            <a:spLocks noGrp="1"/>
+          </p:cNvSpPr>
+          <p:nvPr>
+            <p:ph type="sldNum" sz="quarter" idx="10"/>
+          </p:nvPr>
+        </p:nvSpPr>
+        <p:spPr/>
+        <p:txBody>
+          <a:bodyPr/>
+          <a:lstStyle/>
+          <a:p>
+            <a:fld id="{E4B35BDD-CC3D-4492-88ED-922B282360E3}" type="slidenum">
+              <a:rPr lang="pt-BR" smtClean="0"/>
+              <a:t>59</a:t>
+            </a:fld>
+            <a:endParaRPr lang="pt-BR"/>
+          </a:p>
+        </p:txBody>
+      </p:sp>
+    </p:spTree>
+    <p:extLst>
+      <p:ext uri="{BB962C8B-B14F-4D97-AF65-F5344CB8AC3E}">
+        <p14:creationId xmlns:p14="http://schemas.microsoft.com/office/powerpoint/2010/main" val="3613362899"/>
+      </p:ext>
+    </p:extLst>
   </p:cSld>
   <p:clrMapOvr>
     <a:masterClrMapping/>
@@ -21922,6 +22303,2144 @@
 </p:sld>
 </file>
 
+<file path=ppt/slides/slide60.xml><?xml version="1.0" encoding="utf-8"?>
+<p:sld xmlns:a="http://schemas.openxmlformats.org/drawingml/2006/main" xmlns:r="http://schemas.openxmlformats.org/officeDocument/2006/relationships" xmlns:p="http://schemas.openxmlformats.org/presentationml/2006/main">
+  <p:cSld>
+    <p:spTree>
+      <p:nvGrpSpPr>
+        <p:cNvPr id="1" name=""/>
+        <p:cNvGrpSpPr/>
+        <p:nvPr/>
+      </p:nvGrpSpPr>
+      <p:grpSpPr>
+        <a:xfrm>
+          <a:off x="0" y="0"/>
+          <a:ext cx="0" cy="0"/>
+          <a:chOff x="0" y="0"/>
+          <a:chExt cx="0" cy="0"/>
+        </a:xfrm>
+      </p:grpSpPr>
+      <p:sp>
+        <p:nvSpPr>
+          <p:cNvPr id="4" name="Título 3">
+            <a:extLst>
+              <a:ext uri="{FF2B5EF4-FFF2-40B4-BE49-F238E27FC236}">
+                <a16:creationId xmlns:a16="http://schemas.microsoft.com/office/drawing/2014/main" id="{8A4C52A0-42D9-47BB-966A-7FE92FDBFA2D}"/>
+              </a:ext>
+            </a:extLst>
+          </p:cNvPr>
+          <p:cNvSpPr>
+            <a:spLocks noGrp="1"/>
+          </p:cNvSpPr>
+          <p:nvPr>
+            <p:ph type="title"/>
+          </p:nvPr>
+        </p:nvSpPr>
+        <p:spPr/>
+        <p:txBody>
+          <a:bodyPr>
+            <a:normAutofit/>
+          </a:bodyPr>
+          <a:lstStyle/>
+          <a:p>
+            <a:r>
+              <a:rPr lang="pt-BR" dirty="0"/>
+              <a:t>Por que usar OO?</a:t>
+            </a:r>
+          </a:p>
+        </p:txBody>
+      </p:sp>
+      <p:sp>
+        <p:nvSpPr>
+          <p:cNvPr id="5" name="Espaço Reservado para Conteúdo 4">
+            <a:extLst>
+              <a:ext uri="{FF2B5EF4-FFF2-40B4-BE49-F238E27FC236}">
+                <a16:creationId xmlns:a16="http://schemas.microsoft.com/office/drawing/2014/main" id="{1FBD8255-54D1-42B3-9B71-2D45D227E6FC}"/>
+              </a:ext>
+            </a:extLst>
+          </p:cNvPr>
+          <p:cNvSpPr>
+            <a:spLocks noGrp="1"/>
+          </p:cNvSpPr>
+          <p:nvPr>
+            <p:ph type="body" idx="1"/>
+          </p:nvPr>
+        </p:nvSpPr>
+        <p:spPr>
+          <a:xfrm>
+            <a:off x="1689100" y="2604530"/>
+            <a:ext cx="21005800" cy="10609446"/>
+          </a:xfrm>
+          <a:solidFill>
+            <a:schemeClr val="bg1"/>
+          </a:solidFill>
+        </p:spPr>
+        <p:txBody>
+          <a:bodyPr>
+            <a:noAutofit/>
+          </a:bodyPr>
+          <a:lstStyle/>
+          <a:p>
+            <a:pPr>
+              <a:buSzPct val="100000"/>
+            </a:pPr>
+            <a:r>
+              <a:rPr lang="pt-BR" sz="4000" dirty="0">
+                <a:cs typeface="Courier New" panose="02070309020205020404" pitchFamily="49" charset="0"/>
+              </a:rPr>
+              <a:t>Usar apenas essas três estruturas pode apresentar algumas limitações:</a:t>
+            </a:r>
+          </a:p>
+          <a:p>
+            <a:pPr marL="571500" indent="-571500">
+              <a:buSzPct val="100000"/>
+              <a:buFont typeface="Arial" panose="020B0604020202020204" pitchFamily="34" charset="0"/>
+              <a:buChar char="•"/>
+            </a:pPr>
+            <a:r>
+              <a:rPr lang="pt-BR" sz="4000" dirty="0">
+                <a:cs typeface="Courier New" panose="02070309020205020404" pitchFamily="49" charset="0"/>
+              </a:rPr>
+              <a:t>Quanto mais complexo o programa se torna, mais difícil fica a manutenção de uma sequência organizada de código;</a:t>
+            </a:r>
+          </a:p>
+          <a:p>
+            <a:pPr marL="571500" indent="-571500">
+              <a:buSzPct val="100000"/>
+              <a:buFont typeface="Arial" panose="020B0604020202020204" pitchFamily="34" charset="0"/>
+              <a:buChar char="•"/>
+            </a:pPr>
+            <a:r>
+              <a:rPr lang="pt-BR" sz="4000" dirty="0">
+                <a:cs typeface="Courier New" panose="02070309020205020404" pitchFamily="49" charset="0"/>
+              </a:rPr>
+              <a:t>Com esse paradigma é muito fácil deixar o código extenso e com muitas duplicações;</a:t>
+            </a:r>
+          </a:p>
+          <a:p>
+            <a:pPr marL="571500" indent="-571500">
+              <a:buSzPct val="100000"/>
+              <a:buFont typeface="Arial" panose="020B0604020202020204" pitchFamily="34" charset="0"/>
+              <a:buChar char="•"/>
+            </a:pPr>
+            <a:r>
+              <a:rPr lang="pt-BR" sz="4000" dirty="0">
+                <a:cs typeface="Courier New" panose="02070309020205020404" pitchFamily="49" charset="0"/>
+              </a:rPr>
+              <a:t>Mesmo modularizações providas pelas linguagens podem deixar o código muito complexo.</a:t>
+            </a:r>
+          </a:p>
+          <a:p>
+            <a:pPr>
+              <a:buSzPct val="100000"/>
+            </a:pPr>
+            <a:r>
+              <a:rPr lang="pt-BR" sz="4000" dirty="0">
+                <a:cs typeface="Courier New" panose="02070309020205020404" pitchFamily="49" charset="0"/>
+              </a:rPr>
+              <a:t>Em resumo, a simplificação da representação das reais necessidades dos problemas a serem automatizados leva a uma facilidade de entendimento e representação. Porém, isso pode levar a uma complexidade de programação caso o nicho de negócio do sistema-alvo seja complexo.</a:t>
+            </a:r>
+          </a:p>
+        </p:txBody>
+      </p:sp>
+      <p:sp>
+        <p:nvSpPr>
+          <p:cNvPr id="7" name="Espaço Reservado para Número de Slide 6">
+            <a:extLst>
+              <a:ext uri="{FF2B5EF4-FFF2-40B4-BE49-F238E27FC236}">
+                <a16:creationId xmlns:a16="http://schemas.microsoft.com/office/drawing/2014/main" id="{40C5ECBA-0615-433C-B308-162C7F749201}"/>
+              </a:ext>
+            </a:extLst>
+          </p:cNvPr>
+          <p:cNvSpPr>
+            <a:spLocks noGrp="1"/>
+          </p:cNvSpPr>
+          <p:nvPr>
+            <p:ph type="sldNum" sz="quarter" idx="10"/>
+          </p:nvPr>
+        </p:nvSpPr>
+        <p:spPr/>
+        <p:txBody>
+          <a:bodyPr/>
+          <a:lstStyle/>
+          <a:p>
+            <a:fld id="{E4B35BDD-CC3D-4492-88ED-922B282360E3}" type="slidenum">
+              <a:rPr lang="pt-BR" smtClean="0"/>
+              <a:t>60</a:t>
+            </a:fld>
+            <a:endParaRPr lang="pt-BR"/>
+          </a:p>
+        </p:txBody>
+      </p:sp>
+    </p:spTree>
+    <p:extLst>
+      <p:ext uri="{BB962C8B-B14F-4D97-AF65-F5344CB8AC3E}">
+        <p14:creationId xmlns:p14="http://schemas.microsoft.com/office/powerpoint/2010/main" val="442414831"/>
+      </p:ext>
+    </p:extLst>
+  </p:cSld>
+  <p:clrMapOvr>
+    <a:masterClrMapping/>
+  </p:clrMapOvr>
+  <p:transition spd="med"/>
+</p:sld>
+</file>
+
+<file path=ppt/slides/slide61.xml><?xml version="1.0" encoding="utf-8"?>
+<p:sld xmlns:a="http://schemas.openxmlformats.org/drawingml/2006/main" xmlns:r="http://schemas.openxmlformats.org/officeDocument/2006/relationships" xmlns:p="http://schemas.openxmlformats.org/presentationml/2006/main">
+  <p:cSld>
+    <p:spTree>
+      <p:nvGrpSpPr>
+        <p:cNvPr id="1" name=""/>
+        <p:cNvGrpSpPr/>
+        <p:nvPr/>
+      </p:nvGrpSpPr>
+      <p:grpSpPr>
+        <a:xfrm>
+          <a:off x="0" y="0"/>
+          <a:ext cx="0" cy="0"/>
+          <a:chOff x="0" y="0"/>
+          <a:chExt cx="0" cy="0"/>
+        </a:xfrm>
+      </p:grpSpPr>
+      <p:sp>
+        <p:nvSpPr>
+          <p:cNvPr id="4" name="Título 3">
+            <a:extLst>
+              <a:ext uri="{FF2B5EF4-FFF2-40B4-BE49-F238E27FC236}">
+                <a16:creationId xmlns:a16="http://schemas.microsoft.com/office/drawing/2014/main" id="{8A4C52A0-42D9-47BB-966A-7FE92FDBFA2D}"/>
+              </a:ext>
+            </a:extLst>
+          </p:cNvPr>
+          <p:cNvSpPr>
+            <a:spLocks noGrp="1"/>
+          </p:cNvSpPr>
+          <p:nvPr>
+            <p:ph type="title"/>
+          </p:nvPr>
+        </p:nvSpPr>
+        <p:spPr/>
+        <p:txBody>
+          <a:bodyPr>
+            <a:normAutofit/>
+          </a:bodyPr>
+          <a:lstStyle/>
+          <a:p>
+            <a:r>
+              <a:rPr lang="pt-BR" dirty="0"/>
+              <a:t>Por que usar OO?</a:t>
+            </a:r>
+          </a:p>
+        </p:txBody>
+      </p:sp>
+      <p:sp>
+        <p:nvSpPr>
+          <p:cNvPr id="5" name="Espaço Reservado para Conteúdo 4">
+            <a:extLst>
+              <a:ext uri="{FF2B5EF4-FFF2-40B4-BE49-F238E27FC236}">
+                <a16:creationId xmlns:a16="http://schemas.microsoft.com/office/drawing/2014/main" id="{1FBD8255-54D1-42B3-9B71-2D45D227E6FC}"/>
+              </a:ext>
+            </a:extLst>
+          </p:cNvPr>
+          <p:cNvSpPr>
+            <a:spLocks noGrp="1"/>
+          </p:cNvSpPr>
+          <p:nvPr>
+            <p:ph type="body" idx="1"/>
+          </p:nvPr>
+        </p:nvSpPr>
+        <p:spPr>
+          <a:xfrm>
+            <a:off x="1689100" y="2604530"/>
+            <a:ext cx="21005800" cy="10609446"/>
+          </a:xfrm>
+          <a:solidFill>
+            <a:schemeClr val="bg1"/>
+          </a:solidFill>
+        </p:spPr>
+        <p:txBody>
+          <a:bodyPr>
+            <a:noAutofit/>
+          </a:bodyPr>
+          <a:lstStyle/>
+          <a:p>
+            <a:pPr>
+              <a:buSzPct val="100000"/>
+            </a:pPr>
+            <a:r>
+              <a:rPr lang="pt-BR" sz="4000" dirty="0">
+                <a:cs typeface="Courier New" panose="02070309020205020404" pitchFamily="49" charset="0"/>
+              </a:rPr>
+              <a:t>Ao contrário do paradigma procedural, a OO preconiza que os dados relativos a uma representação de uma entidade do mundo real devem somente estar juntos de suas operações, quais são os responsáveis por manipular - exclusivamente - tais dados.</a:t>
+            </a:r>
+          </a:p>
+          <a:p>
+            <a:pPr>
+              <a:buSzPct val="100000"/>
+            </a:pPr>
+            <a:r>
+              <a:rPr lang="pt-BR" sz="4000" dirty="0">
+                <a:cs typeface="Courier New" panose="02070309020205020404" pitchFamily="49" charset="0"/>
+              </a:rPr>
+              <a:t>Assim, há uma separação de dados e operações que não dizem respeito a uma mesma entidade. Todavia, se tais entidades necessitarem trocar informações, farão isto através da chamada de seus métodos, e não de acessos diretos a informações da outra.</a:t>
+            </a:r>
+          </a:p>
+          <a:p>
+            <a:pPr>
+              <a:buSzPct val="100000"/>
+            </a:pPr>
+            <a:endParaRPr lang="pt-BR" sz="4000" dirty="0">
+              <a:cs typeface="Courier New" panose="02070309020205020404" pitchFamily="49" charset="0"/>
+            </a:endParaRPr>
+          </a:p>
+          <a:p>
+            <a:pPr>
+              <a:buSzPct val="100000"/>
+            </a:pPr>
+            <a:endParaRPr lang="pt-BR" sz="4000" dirty="0">
+              <a:cs typeface="Courier New" panose="02070309020205020404" pitchFamily="49" charset="0"/>
+            </a:endParaRPr>
+          </a:p>
+          <a:p>
+            <a:pPr>
+              <a:buSzPct val="100000"/>
+            </a:pPr>
+            <a:endParaRPr lang="pt-BR" sz="4000" dirty="0">
+              <a:cs typeface="Courier New" panose="02070309020205020404" pitchFamily="49" charset="0"/>
+            </a:endParaRPr>
+          </a:p>
+          <a:p>
+            <a:pPr>
+              <a:buSzPct val="100000"/>
+            </a:pPr>
+            <a:endParaRPr lang="pt-BR" sz="4000" dirty="0">
+              <a:cs typeface="Courier New" panose="02070309020205020404" pitchFamily="49" charset="0"/>
+            </a:endParaRPr>
+          </a:p>
+          <a:p>
+            <a:pPr>
+              <a:buSzPct val="100000"/>
+            </a:pPr>
+            <a:endParaRPr lang="pt-BR" sz="4000" dirty="0">
+              <a:cs typeface="Courier New" panose="02070309020205020404" pitchFamily="49" charset="0"/>
+            </a:endParaRPr>
+          </a:p>
+        </p:txBody>
+      </p:sp>
+      <p:sp>
+        <p:nvSpPr>
+          <p:cNvPr id="7" name="Espaço Reservado para Número de Slide 6">
+            <a:extLst>
+              <a:ext uri="{FF2B5EF4-FFF2-40B4-BE49-F238E27FC236}">
+                <a16:creationId xmlns:a16="http://schemas.microsoft.com/office/drawing/2014/main" id="{40C5ECBA-0615-433C-B308-162C7F749201}"/>
+              </a:ext>
+            </a:extLst>
+          </p:cNvPr>
+          <p:cNvSpPr>
+            <a:spLocks noGrp="1"/>
+          </p:cNvSpPr>
+          <p:nvPr>
+            <p:ph type="sldNum" sz="quarter" idx="10"/>
+          </p:nvPr>
+        </p:nvSpPr>
+        <p:spPr/>
+        <p:txBody>
+          <a:bodyPr/>
+          <a:lstStyle/>
+          <a:p>
+            <a:fld id="{E4B35BDD-CC3D-4492-88ED-922B282360E3}" type="slidenum">
+              <a:rPr lang="pt-BR" smtClean="0"/>
+              <a:t>61</a:t>
+            </a:fld>
+            <a:endParaRPr lang="pt-BR"/>
+          </a:p>
+        </p:txBody>
+      </p:sp>
+      <p:pic>
+        <p:nvPicPr>
+          <p:cNvPr id="3" name="Imagem 2">
+            <a:extLst>
+              <a:ext uri="{FF2B5EF4-FFF2-40B4-BE49-F238E27FC236}">
+                <a16:creationId xmlns:a16="http://schemas.microsoft.com/office/drawing/2014/main" id="{B4BECAA9-4297-477F-BBB6-60BC3A04AFA3}"/>
+              </a:ext>
+            </a:extLst>
+          </p:cNvPr>
+          <p:cNvPicPr>
+            <a:picLocks noChangeAspect="1"/>
+          </p:cNvPicPr>
+          <p:nvPr/>
+        </p:nvPicPr>
+        <p:blipFill>
+          <a:blip r:embed="rId2">
+            <a:extLst>
+              <a:ext uri="{28A0092B-C50C-407E-A947-70E740481C1C}">
+                <a14:useLocalDpi xmlns:a14="http://schemas.microsoft.com/office/drawing/2010/main" val="0"/>
+              </a:ext>
+            </a:extLst>
+          </a:blip>
+          <a:stretch>
+            <a:fillRect/>
+          </a:stretch>
+        </p:blipFill>
+        <p:spPr>
+          <a:xfrm>
+            <a:off x="7573108" y="7256585"/>
+            <a:ext cx="9237784" cy="4399540"/>
+          </a:xfrm>
+          <a:prstGeom prst="rect">
+            <a:avLst/>
+          </a:prstGeom>
+        </p:spPr>
+      </p:pic>
+    </p:spTree>
+    <p:extLst>
+      <p:ext uri="{BB962C8B-B14F-4D97-AF65-F5344CB8AC3E}">
+        <p14:creationId xmlns:p14="http://schemas.microsoft.com/office/powerpoint/2010/main" val="2989687155"/>
+      </p:ext>
+    </p:extLst>
+  </p:cSld>
+  <p:clrMapOvr>
+    <a:masterClrMapping/>
+  </p:clrMapOvr>
+  <p:transition spd="med"/>
+</p:sld>
+</file>
+
+<file path=ppt/slides/slide62.xml><?xml version="1.0" encoding="utf-8"?>
+<p:sld xmlns:a="http://schemas.openxmlformats.org/drawingml/2006/main" xmlns:r="http://schemas.openxmlformats.org/officeDocument/2006/relationships" xmlns:p="http://schemas.openxmlformats.org/presentationml/2006/main">
+  <p:cSld>
+    <p:spTree>
+      <p:nvGrpSpPr>
+        <p:cNvPr id="1" name=""/>
+        <p:cNvGrpSpPr/>
+        <p:nvPr/>
+      </p:nvGrpSpPr>
+      <p:grpSpPr>
+        <a:xfrm>
+          <a:off x="0" y="0"/>
+          <a:ext cx="0" cy="0"/>
+          <a:chOff x="0" y="0"/>
+          <a:chExt cx="0" cy="0"/>
+        </a:xfrm>
+      </p:grpSpPr>
+      <p:sp>
+        <p:nvSpPr>
+          <p:cNvPr id="4" name="Título 3">
+            <a:extLst>
+              <a:ext uri="{FF2B5EF4-FFF2-40B4-BE49-F238E27FC236}">
+                <a16:creationId xmlns:a16="http://schemas.microsoft.com/office/drawing/2014/main" id="{8A4C52A0-42D9-47BB-966A-7FE92FDBFA2D}"/>
+              </a:ext>
+            </a:extLst>
+          </p:cNvPr>
+          <p:cNvSpPr>
+            <a:spLocks noGrp="1"/>
+          </p:cNvSpPr>
+          <p:nvPr>
+            <p:ph type="title"/>
+          </p:nvPr>
+        </p:nvSpPr>
+        <p:spPr/>
+        <p:txBody>
+          <a:bodyPr>
+            <a:normAutofit/>
+          </a:bodyPr>
+          <a:lstStyle/>
+          <a:p>
+            <a:r>
+              <a:rPr lang="pt-BR" dirty="0"/>
+              <a:t>Fundamentos da OO</a:t>
+            </a:r>
+          </a:p>
+        </p:txBody>
+      </p:sp>
+      <p:sp>
+        <p:nvSpPr>
+          <p:cNvPr id="5" name="Espaço Reservado para Conteúdo 4">
+            <a:extLst>
+              <a:ext uri="{FF2B5EF4-FFF2-40B4-BE49-F238E27FC236}">
+                <a16:creationId xmlns:a16="http://schemas.microsoft.com/office/drawing/2014/main" id="{1FBD8255-54D1-42B3-9B71-2D45D227E6FC}"/>
+              </a:ext>
+            </a:extLst>
+          </p:cNvPr>
+          <p:cNvSpPr>
+            <a:spLocks noGrp="1"/>
+          </p:cNvSpPr>
+          <p:nvPr>
+            <p:ph type="body" idx="1"/>
+          </p:nvPr>
+        </p:nvSpPr>
+        <p:spPr>
+          <a:xfrm>
+            <a:off x="1689100" y="2604530"/>
+            <a:ext cx="21005800" cy="10609446"/>
+          </a:xfrm>
+          <a:solidFill>
+            <a:schemeClr val="bg1"/>
+          </a:solidFill>
+        </p:spPr>
+        <p:txBody>
+          <a:bodyPr>
+            <a:noAutofit/>
+          </a:bodyPr>
+          <a:lstStyle/>
+          <a:p>
+            <a:pPr>
+              <a:buSzPct val="100000"/>
+            </a:pPr>
+            <a:r>
+              <a:rPr lang="pt-BR" sz="4000" dirty="0">
+                <a:cs typeface="Courier New" panose="02070309020205020404" pitchFamily="49" charset="0"/>
+              </a:rPr>
+              <a:t>Abstração:</a:t>
+            </a:r>
+          </a:p>
+          <a:p>
+            <a:pPr marL="571500" indent="-571500">
+              <a:buSzPct val="100000"/>
+              <a:buFont typeface="Arial" panose="020B0604020202020204" pitchFamily="34" charset="0"/>
+              <a:buChar char="•"/>
+            </a:pPr>
+            <a:r>
+              <a:rPr lang="pt-BR" sz="4000" dirty="0">
+                <a:cs typeface="Courier New" panose="02070309020205020404" pitchFamily="49" charset="0"/>
+              </a:rPr>
+              <a:t>Processo pelo qual se isolam características de um objeto, considerando os que tenham em comum certos grupos de objetos.</a:t>
+            </a:r>
+          </a:p>
+          <a:p>
+            <a:pPr marL="571500" indent="-571500">
+              <a:buSzPct val="100000"/>
+              <a:buFont typeface="Arial" panose="020B0604020202020204" pitchFamily="34" charset="0"/>
+              <a:buChar char="•"/>
+            </a:pPr>
+            <a:r>
+              <a:rPr lang="pt-BR" sz="4000" dirty="0">
+                <a:cs typeface="Courier New" panose="02070309020205020404" pitchFamily="49" charset="0"/>
+              </a:rPr>
+              <a:t>Não devemos nos preocupar com características menos importantes, ou seja, acidentais. Devemos, neste caso, nos concentrar apenas nos aspectos essenciais. Por natureza, as abstrações devem ser incompletas e imprecisas.</a:t>
+            </a:r>
+          </a:p>
+          <a:p>
+            <a:pPr marL="571500" indent="-571500">
+              <a:buSzPct val="100000"/>
+              <a:buFont typeface="Arial" panose="020B0604020202020204" pitchFamily="34" charset="0"/>
+              <a:buChar char="•"/>
+            </a:pPr>
+            <a:endParaRPr lang="pt-BR" sz="4000" dirty="0">
+              <a:cs typeface="Courier New" panose="02070309020205020404" pitchFamily="49" charset="0"/>
+            </a:endParaRPr>
+          </a:p>
+        </p:txBody>
+      </p:sp>
+      <p:sp>
+        <p:nvSpPr>
+          <p:cNvPr id="7" name="Espaço Reservado para Número de Slide 6">
+            <a:extLst>
+              <a:ext uri="{FF2B5EF4-FFF2-40B4-BE49-F238E27FC236}">
+                <a16:creationId xmlns:a16="http://schemas.microsoft.com/office/drawing/2014/main" id="{40C5ECBA-0615-433C-B308-162C7F749201}"/>
+              </a:ext>
+            </a:extLst>
+          </p:cNvPr>
+          <p:cNvSpPr>
+            <a:spLocks noGrp="1"/>
+          </p:cNvSpPr>
+          <p:nvPr>
+            <p:ph type="sldNum" sz="quarter" idx="10"/>
+          </p:nvPr>
+        </p:nvSpPr>
+        <p:spPr/>
+        <p:txBody>
+          <a:bodyPr/>
+          <a:lstStyle/>
+          <a:p>
+            <a:fld id="{E4B35BDD-CC3D-4492-88ED-922B282360E3}" type="slidenum">
+              <a:rPr lang="pt-BR" smtClean="0"/>
+              <a:t>62</a:t>
+            </a:fld>
+            <a:endParaRPr lang="pt-BR"/>
+          </a:p>
+        </p:txBody>
+      </p:sp>
+      <p:pic>
+        <p:nvPicPr>
+          <p:cNvPr id="6" name="Imagem 5">
+            <a:extLst>
+              <a:ext uri="{FF2B5EF4-FFF2-40B4-BE49-F238E27FC236}">
+                <a16:creationId xmlns:a16="http://schemas.microsoft.com/office/drawing/2014/main" id="{8266C9B5-0DAB-4ADF-9006-750A6B001EC4}"/>
+              </a:ext>
+            </a:extLst>
+          </p:cNvPr>
+          <p:cNvPicPr>
+            <a:picLocks noChangeAspect="1"/>
+          </p:cNvPicPr>
+          <p:nvPr/>
+        </p:nvPicPr>
+        <p:blipFill>
+          <a:blip r:embed="rId2">
+            <a:extLst>
+              <a:ext uri="{28A0092B-C50C-407E-A947-70E740481C1C}">
+                <a14:useLocalDpi xmlns:a14="http://schemas.microsoft.com/office/drawing/2010/main" val="0"/>
+              </a:ext>
+            </a:extLst>
+          </a:blip>
+          <a:stretch>
+            <a:fillRect/>
+          </a:stretch>
+        </p:blipFill>
+        <p:spPr>
+          <a:xfrm>
+            <a:off x="9418079" y="7445389"/>
+            <a:ext cx="5547841" cy="5296359"/>
+          </a:xfrm>
+          <a:prstGeom prst="rect">
+            <a:avLst/>
+          </a:prstGeom>
+        </p:spPr>
+      </p:pic>
+    </p:spTree>
+    <p:extLst>
+      <p:ext uri="{BB962C8B-B14F-4D97-AF65-F5344CB8AC3E}">
+        <p14:creationId xmlns:p14="http://schemas.microsoft.com/office/powerpoint/2010/main" val="2978138725"/>
+      </p:ext>
+    </p:extLst>
+  </p:cSld>
+  <p:clrMapOvr>
+    <a:masterClrMapping/>
+  </p:clrMapOvr>
+  <p:transition spd="med"/>
+</p:sld>
+</file>
+
+<file path=ppt/slides/slide63.xml><?xml version="1.0" encoding="utf-8"?>
+<p:sld xmlns:a="http://schemas.openxmlformats.org/drawingml/2006/main" xmlns:r="http://schemas.openxmlformats.org/officeDocument/2006/relationships" xmlns:p="http://schemas.openxmlformats.org/presentationml/2006/main">
+  <p:cSld>
+    <p:spTree>
+      <p:nvGrpSpPr>
+        <p:cNvPr id="1" name=""/>
+        <p:cNvGrpSpPr/>
+        <p:nvPr/>
+      </p:nvGrpSpPr>
+      <p:grpSpPr>
+        <a:xfrm>
+          <a:off x="0" y="0"/>
+          <a:ext cx="0" cy="0"/>
+          <a:chOff x="0" y="0"/>
+          <a:chExt cx="0" cy="0"/>
+        </a:xfrm>
+      </p:grpSpPr>
+      <p:sp>
+        <p:nvSpPr>
+          <p:cNvPr id="4" name="Título 3">
+            <a:extLst>
+              <a:ext uri="{FF2B5EF4-FFF2-40B4-BE49-F238E27FC236}">
+                <a16:creationId xmlns:a16="http://schemas.microsoft.com/office/drawing/2014/main" id="{8A4C52A0-42D9-47BB-966A-7FE92FDBFA2D}"/>
+              </a:ext>
+            </a:extLst>
+          </p:cNvPr>
+          <p:cNvSpPr>
+            <a:spLocks noGrp="1"/>
+          </p:cNvSpPr>
+          <p:nvPr>
+            <p:ph type="title"/>
+          </p:nvPr>
+        </p:nvSpPr>
+        <p:spPr/>
+        <p:txBody>
+          <a:bodyPr>
+            <a:normAutofit/>
+          </a:bodyPr>
+          <a:lstStyle/>
+          <a:p>
+            <a:r>
+              <a:rPr lang="pt-BR" dirty="0"/>
+              <a:t>Fundamentos da OO</a:t>
+            </a:r>
+          </a:p>
+        </p:txBody>
+      </p:sp>
+      <p:sp>
+        <p:nvSpPr>
+          <p:cNvPr id="5" name="Espaço Reservado para Conteúdo 4">
+            <a:extLst>
+              <a:ext uri="{FF2B5EF4-FFF2-40B4-BE49-F238E27FC236}">
+                <a16:creationId xmlns:a16="http://schemas.microsoft.com/office/drawing/2014/main" id="{1FBD8255-54D1-42B3-9B71-2D45D227E6FC}"/>
+              </a:ext>
+            </a:extLst>
+          </p:cNvPr>
+          <p:cNvSpPr>
+            <a:spLocks noGrp="1"/>
+          </p:cNvSpPr>
+          <p:nvPr>
+            <p:ph type="body" idx="1"/>
+          </p:nvPr>
+        </p:nvSpPr>
+        <p:spPr>
+          <a:xfrm>
+            <a:off x="1689100" y="2604530"/>
+            <a:ext cx="21005800" cy="10609446"/>
+          </a:xfrm>
+          <a:solidFill>
+            <a:schemeClr val="bg1"/>
+          </a:solidFill>
+        </p:spPr>
+        <p:txBody>
+          <a:bodyPr>
+            <a:noAutofit/>
+          </a:bodyPr>
+          <a:lstStyle/>
+          <a:p>
+            <a:pPr>
+              <a:buSzPct val="100000"/>
+            </a:pPr>
+            <a:r>
+              <a:rPr lang="pt-BR" sz="4000" dirty="0">
+                <a:cs typeface="Courier New" panose="02070309020205020404" pitchFamily="49" charset="0"/>
+              </a:rPr>
+              <a:t>Abstração:</a:t>
+            </a:r>
+          </a:p>
+          <a:p>
+            <a:pPr marL="571500" indent="-571500">
+              <a:buSzPct val="100000"/>
+              <a:buFont typeface="Arial" panose="020B0604020202020204" pitchFamily="34" charset="0"/>
+              <a:buChar char="•"/>
+            </a:pPr>
+            <a:r>
+              <a:rPr lang="pt-BR" sz="4000" dirty="0">
+                <a:cs typeface="Courier New" panose="02070309020205020404" pitchFamily="49" charset="0"/>
+              </a:rPr>
+              <a:t>Com a abstração dos conceitos, conseguimos reaproveitar, de forma mais eficiente, o nosso “molde” inicial, que pode ser detalhado conforme for necessário para o nosso caso específico.</a:t>
+            </a:r>
+          </a:p>
+          <a:p>
+            <a:pPr marL="571500" indent="-571500">
+              <a:buSzPct val="100000"/>
+              <a:buFont typeface="Arial" panose="020B0604020202020204" pitchFamily="34" charset="0"/>
+              <a:buChar char="•"/>
+            </a:pPr>
+            <a:r>
+              <a:rPr lang="pt-BR" sz="4000" dirty="0">
+                <a:cs typeface="Courier New" panose="02070309020205020404" pitchFamily="49" charset="0"/>
+              </a:rPr>
+              <a:t>Os processos de inicialmente se pensar no mais abstrato e, posteriormente, acrescentar ou se adaptar são também conhecidos como </a:t>
+            </a:r>
+            <a:r>
+              <a:rPr lang="pt-BR" sz="4000" b="1" dirty="0">
+                <a:cs typeface="Courier New" panose="02070309020205020404" pitchFamily="49" charset="0"/>
+              </a:rPr>
+              <a:t>generalização</a:t>
+            </a:r>
+            <a:r>
+              <a:rPr lang="pt-BR" sz="4000" dirty="0">
+                <a:cs typeface="Courier New" panose="02070309020205020404" pitchFamily="49" charset="0"/>
+              </a:rPr>
+              <a:t> e </a:t>
+            </a:r>
+            <a:r>
+              <a:rPr lang="pt-BR" sz="4000" b="1" dirty="0">
+                <a:cs typeface="Courier New" panose="02070309020205020404" pitchFamily="49" charset="0"/>
+              </a:rPr>
+              <a:t>especialização</a:t>
+            </a:r>
+            <a:r>
+              <a:rPr lang="pt-BR" sz="4000" dirty="0">
+                <a:cs typeface="Courier New" panose="02070309020205020404" pitchFamily="49" charset="0"/>
+              </a:rPr>
+              <a:t>, respectivamente.</a:t>
+            </a:r>
+          </a:p>
+        </p:txBody>
+      </p:sp>
+      <p:sp>
+        <p:nvSpPr>
+          <p:cNvPr id="7" name="Espaço Reservado para Número de Slide 6">
+            <a:extLst>
+              <a:ext uri="{FF2B5EF4-FFF2-40B4-BE49-F238E27FC236}">
+                <a16:creationId xmlns:a16="http://schemas.microsoft.com/office/drawing/2014/main" id="{40C5ECBA-0615-433C-B308-162C7F749201}"/>
+              </a:ext>
+            </a:extLst>
+          </p:cNvPr>
+          <p:cNvSpPr>
+            <a:spLocks noGrp="1"/>
+          </p:cNvSpPr>
+          <p:nvPr>
+            <p:ph type="sldNum" sz="quarter" idx="10"/>
+          </p:nvPr>
+        </p:nvSpPr>
+        <p:spPr/>
+        <p:txBody>
+          <a:bodyPr/>
+          <a:lstStyle/>
+          <a:p>
+            <a:fld id="{E4B35BDD-CC3D-4492-88ED-922B282360E3}" type="slidenum">
+              <a:rPr lang="pt-BR" smtClean="0"/>
+              <a:t>63</a:t>
+            </a:fld>
+            <a:endParaRPr lang="pt-BR"/>
+          </a:p>
+        </p:txBody>
+      </p:sp>
+      <p:pic>
+        <p:nvPicPr>
+          <p:cNvPr id="6" name="Imagem 5">
+            <a:extLst>
+              <a:ext uri="{FF2B5EF4-FFF2-40B4-BE49-F238E27FC236}">
+                <a16:creationId xmlns:a16="http://schemas.microsoft.com/office/drawing/2014/main" id="{8266C9B5-0DAB-4ADF-9006-750A6B001EC4}"/>
+              </a:ext>
+            </a:extLst>
+          </p:cNvPr>
+          <p:cNvPicPr>
+            <a:picLocks noChangeAspect="1"/>
+          </p:cNvPicPr>
+          <p:nvPr/>
+        </p:nvPicPr>
+        <p:blipFill>
+          <a:blip r:embed="rId2">
+            <a:extLst>
+              <a:ext uri="{28A0092B-C50C-407E-A947-70E740481C1C}">
+                <a14:useLocalDpi xmlns:a14="http://schemas.microsoft.com/office/drawing/2010/main" val="0"/>
+              </a:ext>
+            </a:extLst>
+          </a:blip>
+          <a:stretch>
+            <a:fillRect/>
+          </a:stretch>
+        </p:blipFill>
+        <p:spPr>
+          <a:xfrm>
+            <a:off x="9418079" y="7445389"/>
+            <a:ext cx="5547841" cy="5296359"/>
+          </a:xfrm>
+          <a:prstGeom prst="rect">
+            <a:avLst/>
+          </a:prstGeom>
+        </p:spPr>
+      </p:pic>
+    </p:spTree>
+    <p:extLst>
+      <p:ext uri="{BB962C8B-B14F-4D97-AF65-F5344CB8AC3E}">
+        <p14:creationId xmlns:p14="http://schemas.microsoft.com/office/powerpoint/2010/main" val="1338700819"/>
+      </p:ext>
+    </p:extLst>
+  </p:cSld>
+  <p:clrMapOvr>
+    <a:masterClrMapping/>
+  </p:clrMapOvr>
+  <p:transition spd="med"/>
+</p:sld>
+</file>
+
+<file path=ppt/slides/slide64.xml><?xml version="1.0" encoding="utf-8"?>
+<p:sld xmlns:a="http://schemas.openxmlformats.org/drawingml/2006/main" xmlns:r="http://schemas.openxmlformats.org/officeDocument/2006/relationships" xmlns:p="http://schemas.openxmlformats.org/presentationml/2006/main">
+  <p:cSld>
+    <p:spTree>
+      <p:nvGrpSpPr>
+        <p:cNvPr id="1" name=""/>
+        <p:cNvGrpSpPr/>
+        <p:nvPr/>
+      </p:nvGrpSpPr>
+      <p:grpSpPr>
+        <a:xfrm>
+          <a:off x="0" y="0"/>
+          <a:ext cx="0" cy="0"/>
+          <a:chOff x="0" y="0"/>
+          <a:chExt cx="0" cy="0"/>
+        </a:xfrm>
+      </p:grpSpPr>
+      <p:sp>
+        <p:nvSpPr>
+          <p:cNvPr id="4" name="Título 3">
+            <a:extLst>
+              <a:ext uri="{FF2B5EF4-FFF2-40B4-BE49-F238E27FC236}">
+                <a16:creationId xmlns:a16="http://schemas.microsoft.com/office/drawing/2014/main" id="{8A4C52A0-42D9-47BB-966A-7FE92FDBFA2D}"/>
+              </a:ext>
+            </a:extLst>
+          </p:cNvPr>
+          <p:cNvSpPr>
+            <a:spLocks noGrp="1"/>
+          </p:cNvSpPr>
+          <p:nvPr>
+            <p:ph type="title"/>
+          </p:nvPr>
+        </p:nvSpPr>
+        <p:spPr/>
+        <p:txBody>
+          <a:bodyPr>
+            <a:normAutofit/>
+          </a:bodyPr>
+          <a:lstStyle/>
+          <a:p>
+            <a:r>
+              <a:rPr lang="pt-BR" dirty="0"/>
+              <a:t>Fundamentos da OO</a:t>
+            </a:r>
+          </a:p>
+        </p:txBody>
+      </p:sp>
+      <p:sp>
+        <p:nvSpPr>
+          <p:cNvPr id="5" name="Espaço Reservado para Conteúdo 4">
+            <a:extLst>
+              <a:ext uri="{FF2B5EF4-FFF2-40B4-BE49-F238E27FC236}">
+                <a16:creationId xmlns:a16="http://schemas.microsoft.com/office/drawing/2014/main" id="{1FBD8255-54D1-42B3-9B71-2D45D227E6FC}"/>
+              </a:ext>
+            </a:extLst>
+          </p:cNvPr>
+          <p:cNvSpPr>
+            <a:spLocks noGrp="1"/>
+          </p:cNvSpPr>
+          <p:nvPr>
+            <p:ph type="body" idx="1"/>
+          </p:nvPr>
+        </p:nvSpPr>
+        <p:spPr>
+          <a:xfrm>
+            <a:off x="1689100" y="2604530"/>
+            <a:ext cx="21005800" cy="10609446"/>
+          </a:xfrm>
+          <a:solidFill>
+            <a:schemeClr val="bg1"/>
+          </a:solidFill>
+        </p:spPr>
+        <p:txBody>
+          <a:bodyPr>
+            <a:noAutofit/>
+          </a:bodyPr>
+          <a:lstStyle/>
+          <a:p>
+            <a:pPr>
+              <a:buSzPct val="100000"/>
+            </a:pPr>
+            <a:r>
+              <a:rPr lang="pt-BR" sz="4000" dirty="0">
+                <a:cs typeface="Courier New" panose="02070309020205020404" pitchFamily="49" charset="0"/>
+              </a:rPr>
+              <a:t>Reuso:</a:t>
+            </a:r>
+          </a:p>
+          <a:p>
+            <a:pPr marL="571500" indent="-571500">
+              <a:buSzPct val="100000"/>
+              <a:buFont typeface="Arial" panose="020B0604020202020204" pitchFamily="34" charset="0"/>
+              <a:buChar char="•"/>
+            </a:pPr>
+            <a:r>
+              <a:rPr lang="pt-BR" sz="4000" dirty="0">
+                <a:cs typeface="Courier New" panose="02070309020205020404" pitchFamily="49" charset="0"/>
+              </a:rPr>
+              <a:t>Não existe pior prática em programação do que a repetição de código. Isto leva a um código frágil, propício a resultados inesperados. Quanto mais códigos são repetidos pela aplicação, mais difícil vai se tornando sua manutenção.</a:t>
+            </a:r>
+          </a:p>
+          <a:p>
+            <a:pPr marL="571500" indent="-571500">
+              <a:buSzPct val="100000"/>
+              <a:buFont typeface="Arial" panose="020B0604020202020204" pitchFamily="34" charset="0"/>
+              <a:buChar char="•"/>
+            </a:pPr>
+            <a:r>
+              <a:rPr lang="pt-BR" sz="4000" dirty="0">
+                <a:cs typeface="Courier New" panose="02070309020205020404" pitchFamily="49" charset="0"/>
+              </a:rPr>
+              <a:t>O fato de simplesmente utilizarmos uma linguagem OO não é suficiente para se atingir a </a:t>
+            </a:r>
+            <a:r>
+              <a:rPr lang="pt-BR" sz="4000" dirty="0" err="1">
+                <a:cs typeface="Courier New" panose="02070309020205020404" pitchFamily="49" charset="0"/>
+              </a:rPr>
+              <a:t>reusabilidade</a:t>
+            </a:r>
+            <a:r>
+              <a:rPr lang="pt-BR" sz="4000" dirty="0">
+                <a:cs typeface="Courier New" panose="02070309020205020404" pitchFamily="49" charset="0"/>
+              </a:rPr>
+              <a:t>, temos de trabalhar de forma eficiente para aplicar os conceitos de </a:t>
+            </a:r>
+            <a:r>
+              <a:rPr lang="pt-BR" sz="4000" b="1" dirty="0">
+                <a:cs typeface="Courier New" panose="02070309020205020404" pitchFamily="49" charset="0"/>
+              </a:rPr>
+              <a:t>herança</a:t>
+            </a:r>
+            <a:r>
+              <a:rPr lang="pt-BR" sz="4000" dirty="0">
+                <a:cs typeface="Courier New" panose="02070309020205020404" pitchFamily="49" charset="0"/>
+              </a:rPr>
+              <a:t> e </a:t>
+            </a:r>
+            <a:r>
+              <a:rPr lang="pt-BR" sz="4000" b="1" dirty="0">
+                <a:cs typeface="Courier New" panose="02070309020205020404" pitchFamily="49" charset="0"/>
+              </a:rPr>
+              <a:t>associação</a:t>
+            </a:r>
+            <a:r>
+              <a:rPr lang="pt-BR" sz="4000" dirty="0">
+                <a:cs typeface="Courier New" panose="02070309020205020404" pitchFamily="49" charset="0"/>
+              </a:rPr>
+              <a:t>, por exemplo.</a:t>
+            </a:r>
+          </a:p>
+          <a:p>
+            <a:pPr marL="571500" indent="-571500">
+              <a:buSzPct val="100000"/>
+              <a:buFont typeface="Arial" panose="020B0604020202020204" pitchFamily="34" charset="0"/>
+              <a:buChar char="•"/>
+            </a:pPr>
+            <a:r>
+              <a:rPr lang="pt-BR" sz="4000" dirty="0">
+                <a:cs typeface="Courier New" panose="02070309020205020404" pitchFamily="49" charset="0"/>
+              </a:rPr>
+              <a:t>Na herança, é possível criar classes a partir de outras classes. A classe filha, além do que já foi reaproveitada, pode acrescentar o que for necessário para si.</a:t>
+            </a:r>
+          </a:p>
+          <a:p>
+            <a:pPr marL="571500" indent="-571500">
+              <a:buSzPct val="100000"/>
+              <a:buFont typeface="Arial" panose="020B0604020202020204" pitchFamily="34" charset="0"/>
+              <a:buChar char="•"/>
+            </a:pPr>
+            <a:r>
+              <a:rPr lang="pt-BR" sz="4000" dirty="0">
+                <a:cs typeface="Courier New" panose="02070309020205020404" pitchFamily="49" charset="0"/>
+              </a:rPr>
+              <a:t>Já na associação, o reaproveitamento é diferente. Uma classe pede ajuda a outra para poder fazer o que ela não consegue fazer por si só. Em vez de simplesmente repetir, em si, o código que está em outra classe, a associação permite que uma classe forneça uma porção de código a outra. Assim, esta troca mútua culmina por evitar a repetição de código.</a:t>
+            </a:r>
+          </a:p>
+        </p:txBody>
+      </p:sp>
+      <p:sp>
+        <p:nvSpPr>
+          <p:cNvPr id="7" name="Espaço Reservado para Número de Slide 6">
+            <a:extLst>
+              <a:ext uri="{FF2B5EF4-FFF2-40B4-BE49-F238E27FC236}">
+                <a16:creationId xmlns:a16="http://schemas.microsoft.com/office/drawing/2014/main" id="{40C5ECBA-0615-433C-B308-162C7F749201}"/>
+              </a:ext>
+            </a:extLst>
+          </p:cNvPr>
+          <p:cNvSpPr>
+            <a:spLocks noGrp="1"/>
+          </p:cNvSpPr>
+          <p:nvPr>
+            <p:ph type="sldNum" sz="quarter" idx="10"/>
+          </p:nvPr>
+        </p:nvSpPr>
+        <p:spPr/>
+        <p:txBody>
+          <a:bodyPr/>
+          <a:lstStyle/>
+          <a:p>
+            <a:fld id="{E4B35BDD-CC3D-4492-88ED-922B282360E3}" type="slidenum">
+              <a:rPr lang="pt-BR" smtClean="0"/>
+              <a:t>64</a:t>
+            </a:fld>
+            <a:endParaRPr lang="pt-BR"/>
+          </a:p>
+        </p:txBody>
+      </p:sp>
+    </p:spTree>
+    <p:extLst>
+      <p:ext uri="{BB962C8B-B14F-4D97-AF65-F5344CB8AC3E}">
+        <p14:creationId xmlns:p14="http://schemas.microsoft.com/office/powerpoint/2010/main" val="1439646702"/>
+      </p:ext>
+    </p:extLst>
+  </p:cSld>
+  <p:clrMapOvr>
+    <a:masterClrMapping/>
+  </p:clrMapOvr>
+  <p:transition spd="med"/>
+</p:sld>
+</file>
+
+<file path=ppt/slides/slide65.xml><?xml version="1.0" encoding="utf-8"?>
+<p:sld xmlns:a="http://schemas.openxmlformats.org/drawingml/2006/main" xmlns:r="http://schemas.openxmlformats.org/officeDocument/2006/relationships" xmlns:p="http://schemas.openxmlformats.org/presentationml/2006/main">
+  <p:cSld>
+    <p:spTree>
+      <p:nvGrpSpPr>
+        <p:cNvPr id="1" name=""/>
+        <p:cNvGrpSpPr/>
+        <p:nvPr/>
+      </p:nvGrpSpPr>
+      <p:grpSpPr>
+        <a:xfrm>
+          <a:off x="0" y="0"/>
+          <a:ext cx="0" cy="0"/>
+          <a:chOff x="0" y="0"/>
+          <a:chExt cx="0" cy="0"/>
+        </a:xfrm>
+      </p:grpSpPr>
+      <p:sp>
+        <p:nvSpPr>
+          <p:cNvPr id="4" name="Título 3">
+            <a:extLst>
+              <a:ext uri="{FF2B5EF4-FFF2-40B4-BE49-F238E27FC236}">
+                <a16:creationId xmlns:a16="http://schemas.microsoft.com/office/drawing/2014/main" id="{8A4C52A0-42D9-47BB-966A-7FE92FDBFA2D}"/>
+              </a:ext>
+            </a:extLst>
+          </p:cNvPr>
+          <p:cNvSpPr>
+            <a:spLocks noGrp="1"/>
+          </p:cNvSpPr>
+          <p:nvPr>
+            <p:ph type="title"/>
+          </p:nvPr>
+        </p:nvSpPr>
+        <p:spPr/>
+        <p:txBody>
+          <a:bodyPr>
+            <a:normAutofit/>
+          </a:bodyPr>
+          <a:lstStyle/>
+          <a:p>
+            <a:r>
+              <a:rPr lang="pt-BR" dirty="0"/>
+              <a:t>Fundamentos da OO</a:t>
+            </a:r>
+          </a:p>
+        </p:txBody>
+      </p:sp>
+      <p:sp>
+        <p:nvSpPr>
+          <p:cNvPr id="5" name="Espaço Reservado para Conteúdo 4">
+            <a:extLst>
+              <a:ext uri="{FF2B5EF4-FFF2-40B4-BE49-F238E27FC236}">
+                <a16:creationId xmlns:a16="http://schemas.microsoft.com/office/drawing/2014/main" id="{1FBD8255-54D1-42B3-9B71-2D45D227E6FC}"/>
+              </a:ext>
+            </a:extLst>
+          </p:cNvPr>
+          <p:cNvSpPr>
+            <a:spLocks noGrp="1"/>
+          </p:cNvSpPr>
+          <p:nvPr>
+            <p:ph type="body" idx="1"/>
+          </p:nvPr>
+        </p:nvSpPr>
+        <p:spPr>
+          <a:xfrm>
+            <a:off x="1689100" y="2604530"/>
+            <a:ext cx="21005800" cy="10609446"/>
+          </a:xfrm>
+          <a:solidFill>
+            <a:schemeClr val="bg1"/>
+          </a:solidFill>
+        </p:spPr>
+        <p:txBody>
+          <a:bodyPr>
+            <a:noAutofit/>
+          </a:bodyPr>
+          <a:lstStyle/>
+          <a:p>
+            <a:pPr>
+              <a:buSzPct val="100000"/>
+            </a:pPr>
+            <a:r>
+              <a:rPr lang="pt-BR" sz="4000" dirty="0">
+                <a:cs typeface="Courier New" panose="02070309020205020404" pitchFamily="49" charset="0"/>
+              </a:rPr>
+              <a:t>Encapsulamento:</a:t>
+            </a:r>
+          </a:p>
+          <a:p>
+            <a:pPr marL="571500" indent="-571500">
+              <a:buSzPct val="100000"/>
+              <a:buFont typeface="Arial" panose="020B0604020202020204" pitchFamily="34" charset="0"/>
+              <a:buChar char="•"/>
+            </a:pPr>
+            <a:r>
+              <a:rPr lang="pt-BR" sz="4000" dirty="0">
+                <a:cs typeface="Courier New" panose="02070309020205020404" pitchFamily="49" charset="0"/>
+              </a:rPr>
+              <a:t>Quando alguém se consulta com um médico, por estar com um resfriado, seria desesperados se ao final da consulta o médico entregasse a seguinte receita:</a:t>
+            </a:r>
+          </a:p>
+          <a:p>
+            <a:pPr>
+              <a:buSzPct val="100000"/>
+            </a:pPr>
+            <a:r>
+              <a:rPr lang="pt-BR" sz="2400" dirty="0">
+                <a:latin typeface="Verdana" panose="020B0604030504040204" pitchFamily="34" charset="0"/>
+                <a:ea typeface="Verdana" panose="020B0604030504040204" pitchFamily="34" charset="0"/>
+                <a:cs typeface="Courier New" panose="02070309020205020404" pitchFamily="49" charset="0"/>
+              </a:rPr>
+              <a:t>Receituário (Complexo)</a:t>
+            </a:r>
+          </a:p>
+          <a:p>
+            <a:pPr>
+              <a:buSzPct val="100000"/>
+            </a:pPr>
+            <a:r>
+              <a:rPr lang="pt-BR" sz="2400" dirty="0">
+                <a:latin typeface="Verdana" panose="020B0604030504040204" pitchFamily="34" charset="0"/>
+                <a:ea typeface="Verdana" panose="020B0604030504040204" pitchFamily="34" charset="0"/>
+                <a:cs typeface="Courier New" panose="02070309020205020404" pitchFamily="49" charset="0"/>
+              </a:rPr>
+              <a:t>- 400mg de ácido acetilsalicílico</a:t>
+            </a:r>
+          </a:p>
+          <a:p>
+            <a:pPr>
+              <a:buSzPct val="100000"/>
+            </a:pPr>
+            <a:r>
+              <a:rPr lang="pt-BR" sz="2400" dirty="0">
+                <a:latin typeface="Verdana" panose="020B0604030504040204" pitchFamily="34" charset="0"/>
+                <a:ea typeface="Verdana" panose="020B0604030504040204" pitchFamily="34" charset="0"/>
+                <a:cs typeface="Courier New" panose="02070309020205020404" pitchFamily="49" charset="0"/>
+              </a:rPr>
+              <a:t>- 1mg de maleato de </a:t>
+            </a:r>
+            <a:r>
+              <a:rPr lang="pt-BR" sz="2400" dirty="0" err="1">
+                <a:latin typeface="Verdana" panose="020B0604030504040204" pitchFamily="34" charset="0"/>
+                <a:ea typeface="Verdana" panose="020B0604030504040204" pitchFamily="34" charset="0"/>
+                <a:cs typeface="Courier New" panose="02070309020205020404" pitchFamily="49" charset="0"/>
+              </a:rPr>
+              <a:t>dexclorfeniramina</a:t>
+            </a:r>
+            <a:endParaRPr lang="pt-BR" sz="2400" dirty="0">
+              <a:latin typeface="Verdana" panose="020B0604030504040204" pitchFamily="34" charset="0"/>
+              <a:ea typeface="Verdana" panose="020B0604030504040204" pitchFamily="34" charset="0"/>
+              <a:cs typeface="Courier New" panose="02070309020205020404" pitchFamily="49" charset="0"/>
+            </a:endParaRPr>
+          </a:p>
+          <a:p>
+            <a:pPr>
+              <a:buSzPct val="100000"/>
+            </a:pPr>
+            <a:r>
+              <a:rPr lang="pt-BR" sz="2400" dirty="0">
+                <a:latin typeface="Verdana" panose="020B0604030504040204" pitchFamily="34" charset="0"/>
+                <a:ea typeface="Verdana" panose="020B0604030504040204" pitchFamily="34" charset="0"/>
+                <a:cs typeface="Courier New" panose="02070309020205020404" pitchFamily="49" charset="0"/>
+              </a:rPr>
+              <a:t>- 10mg de cloridrato de fenilefrina</a:t>
+            </a:r>
+          </a:p>
+          <a:p>
+            <a:pPr>
+              <a:buSzPct val="100000"/>
+            </a:pPr>
+            <a:r>
+              <a:rPr lang="pt-BR" sz="2400" dirty="0">
+                <a:latin typeface="Verdana" panose="020B0604030504040204" pitchFamily="34" charset="0"/>
+                <a:ea typeface="Verdana" panose="020B0604030504040204" pitchFamily="34" charset="0"/>
+                <a:cs typeface="Courier New" panose="02070309020205020404" pitchFamily="49" charset="0"/>
+              </a:rPr>
+              <a:t>- 30mg de cafeína</a:t>
+            </a:r>
+          </a:p>
+          <a:p>
+            <a:pPr>
+              <a:buSzPct val="100000"/>
+            </a:pPr>
+            <a:r>
+              <a:rPr lang="pt-BR" sz="2400" dirty="0">
+                <a:latin typeface="Verdana" panose="020B0604030504040204" pitchFamily="34" charset="0"/>
+                <a:ea typeface="Verdana" panose="020B0604030504040204" pitchFamily="34" charset="0"/>
+                <a:cs typeface="Courier New" panose="02070309020205020404" pitchFamily="49" charset="0"/>
+              </a:rPr>
+              <a:t>Misturar bem e ingerir com água. Repetir em momentos de crise.</a:t>
+            </a:r>
+          </a:p>
+          <a:p>
+            <a:pPr marL="571500" indent="-571500">
+              <a:buSzPct val="100000"/>
+              <a:buFont typeface="Arial" panose="020B0604020202020204" pitchFamily="34" charset="0"/>
+              <a:buChar char="•"/>
+            </a:pPr>
+            <a:r>
+              <a:rPr lang="pt-BR" sz="4000" dirty="0">
+                <a:cs typeface="Courier New" panose="02070309020205020404" pitchFamily="49" charset="0"/>
+              </a:rPr>
+              <a:t>A primeira coisa que viria em mente seria: onde achar essas substâncias? Será que é vendido tão pouco? Como misturá-las? Existe alguma sequência? Seria uma tarefa difícil - até complexa - de ser realizada. Mais simples do que isso é o que os médicos realmente fazer: passam uma cápsula onde todas estas substâncias já estão prontas. Ou seja, elas já vêm encapsuladas.</a:t>
+            </a:r>
+          </a:p>
+        </p:txBody>
+      </p:sp>
+      <p:sp>
+        <p:nvSpPr>
+          <p:cNvPr id="7" name="Espaço Reservado para Número de Slide 6">
+            <a:extLst>
+              <a:ext uri="{FF2B5EF4-FFF2-40B4-BE49-F238E27FC236}">
+                <a16:creationId xmlns:a16="http://schemas.microsoft.com/office/drawing/2014/main" id="{40C5ECBA-0615-433C-B308-162C7F749201}"/>
+              </a:ext>
+            </a:extLst>
+          </p:cNvPr>
+          <p:cNvSpPr>
+            <a:spLocks noGrp="1"/>
+          </p:cNvSpPr>
+          <p:nvPr>
+            <p:ph type="sldNum" sz="quarter" idx="10"/>
+          </p:nvPr>
+        </p:nvSpPr>
+        <p:spPr/>
+        <p:txBody>
+          <a:bodyPr/>
+          <a:lstStyle/>
+          <a:p>
+            <a:fld id="{E4B35BDD-CC3D-4492-88ED-922B282360E3}" type="slidenum">
+              <a:rPr lang="pt-BR" smtClean="0"/>
+              <a:t>65</a:t>
+            </a:fld>
+            <a:endParaRPr lang="pt-BR"/>
+          </a:p>
+        </p:txBody>
+      </p:sp>
+    </p:spTree>
+    <p:extLst>
+      <p:ext uri="{BB962C8B-B14F-4D97-AF65-F5344CB8AC3E}">
+        <p14:creationId xmlns:p14="http://schemas.microsoft.com/office/powerpoint/2010/main" val="1059878484"/>
+      </p:ext>
+    </p:extLst>
+  </p:cSld>
+  <p:clrMapOvr>
+    <a:masterClrMapping/>
+  </p:clrMapOvr>
+  <p:transition spd="med"/>
+</p:sld>
+</file>
+
+<file path=ppt/slides/slide66.xml><?xml version="1.0" encoding="utf-8"?>
+<p:sld xmlns:a="http://schemas.openxmlformats.org/drawingml/2006/main" xmlns:r="http://schemas.openxmlformats.org/officeDocument/2006/relationships" xmlns:p="http://schemas.openxmlformats.org/presentationml/2006/main">
+  <p:cSld>
+    <p:spTree>
+      <p:nvGrpSpPr>
+        <p:cNvPr id="1" name=""/>
+        <p:cNvGrpSpPr/>
+        <p:nvPr/>
+      </p:nvGrpSpPr>
+      <p:grpSpPr>
+        <a:xfrm>
+          <a:off x="0" y="0"/>
+          <a:ext cx="0" cy="0"/>
+          <a:chOff x="0" y="0"/>
+          <a:chExt cx="0" cy="0"/>
+        </a:xfrm>
+      </p:grpSpPr>
+      <p:sp>
+        <p:nvSpPr>
+          <p:cNvPr id="4" name="Título 3">
+            <a:extLst>
+              <a:ext uri="{FF2B5EF4-FFF2-40B4-BE49-F238E27FC236}">
+                <a16:creationId xmlns:a16="http://schemas.microsoft.com/office/drawing/2014/main" id="{8A4C52A0-42D9-47BB-966A-7FE92FDBFA2D}"/>
+              </a:ext>
+            </a:extLst>
+          </p:cNvPr>
+          <p:cNvSpPr>
+            <a:spLocks noGrp="1"/>
+          </p:cNvSpPr>
+          <p:nvPr>
+            <p:ph type="title"/>
+          </p:nvPr>
+        </p:nvSpPr>
+        <p:spPr/>
+        <p:txBody>
+          <a:bodyPr>
+            <a:normAutofit/>
+          </a:bodyPr>
+          <a:lstStyle/>
+          <a:p>
+            <a:r>
+              <a:rPr lang="pt-BR" dirty="0"/>
+              <a:t>Fundamentos da OO</a:t>
+            </a:r>
+          </a:p>
+        </p:txBody>
+      </p:sp>
+      <p:sp>
+        <p:nvSpPr>
+          <p:cNvPr id="5" name="Espaço Reservado para Conteúdo 4">
+            <a:extLst>
+              <a:ext uri="{FF2B5EF4-FFF2-40B4-BE49-F238E27FC236}">
+                <a16:creationId xmlns:a16="http://schemas.microsoft.com/office/drawing/2014/main" id="{1FBD8255-54D1-42B3-9B71-2D45D227E6FC}"/>
+              </a:ext>
+            </a:extLst>
+          </p:cNvPr>
+          <p:cNvSpPr>
+            <a:spLocks noGrp="1"/>
+          </p:cNvSpPr>
+          <p:nvPr>
+            <p:ph type="body" idx="1"/>
+          </p:nvPr>
+        </p:nvSpPr>
+        <p:spPr>
+          <a:xfrm>
+            <a:off x="1689100" y="2604530"/>
+            <a:ext cx="21005800" cy="10609446"/>
+          </a:xfrm>
+          <a:solidFill>
+            <a:schemeClr val="bg1"/>
+          </a:solidFill>
+        </p:spPr>
+        <p:txBody>
+          <a:bodyPr>
+            <a:noAutofit/>
+          </a:bodyPr>
+          <a:lstStyle/>
+          <a:p>
+            <a:pPr>
+              <a:buSzPct val="100000"/>
+            </a:pPr>
+            <a:r>
+              <a:rPr lang="pt-BR" sz="4000" dirty="0">
+                <a:cs typeface="Courier New" panose="02070309020205020404" pitchFamily="49" charset="0"/>
+              </a:rPr>
+              <a:t>Encapsulamento:</a:t>
+            </a:r>
+          </a:p>
+          <a:p>
+            <a:pPr marL="571500" indent="-571500">
+              <a:buSzPct val="100000"/>
+              <a:buFont typeface="Arial" panose="020B0604020202020204" pitchFamily="34" charset="0"/>
+              <a:buChar char="•"/>
+            </a:pPr>
+            <a:r>
+              <a:rPr lang="pt-BR" sz="4000" dirty="0">
+                <a:cs typeface="Courier New" panose="02070309020205020404" pitchFamily="49" charset="0"/>
+              </a:rPr>
+              <a:t>Com isso, não será preciso se preocupar em saber quanto e como as substâncias devem ser manipuladas para no final termos o comprimido que resolverá o problema. O que interessa é o resultado final, no caso, a cura do resfriado. A complexidade de chegar a essas medidas e como misturá-las não interessa. É um processo que não precisa ser do conhecimento do paciente.</a:t>
+            </a:r>
+          </a:p>
+          <a:p>
+            <a:pPr>
+              <a:buSzPct val="100000"/>
+            </a:pPr>
+            <a:r>
+              <a:rPr lang="pt-BR" sz="2400" dirty="0">
+                <a:latin typeface="Verdana" panose="020B0604030504040204" pitchFamily="34" charset="0"/>
+                <a:ea typeface="Verdana" panose="020B0604030504040204" pitchFamily="34" charset="0"/>
+                <a:cs typeface="Courier New" panose="02070309020205020404" pitchFamily="49" charset="0"/>
+              </a:rPr>
+              <a:t>Receituário (Encapsulado)</a:t>
+            </a:r>
+          </a:p>
+          <a:p>
+            <a:pPr>
+              <a:buSzPct val="100000"/>
+            </a:pPr>
+            <a:r>
+              <a:rPr lang="pt-BR" sz="2400" dirty="0">
+                <a:latin typeface="Verdana" panose="020B0604030504040204" pitchFamily="34" charset="0"/>
+                <a:ea typeface="Verdana" panose="020B0604030504040204" pitchFamily="34" charset="0"/>
+                <a:cs typeface="Courier New" panose="02070309020205020404" pitchFamily="49" charset="0"/>
+              </a:rPr>
+              <a:t>1 comprimido de </a:t>
+            </a:r>
+            <a:r>
+              <a:rPr lang="pt-BR" sz="2400" dirty="0" err="1">
+                <a:latin typeface="Verdana" panose="020B0604030504040204" pitchFamily="34" charset="0"/>
+                <a:ea typeface="Verdana" panose="020B0604030504040204" pitchFamily="34" charset="0"/>
+                <a:cs typeface="Courier New" panose="02070309020205020404" pitchFamily="49" charset="0"/>
+              </a:rPr>
+              <a:t>Resfriol</a:t>
+            </a:r>
+            <a:r>
+              <a:rPr lang="pt-BR" sz="2400" dirty="0">
+                <a:latin typeface="Verdana" panose="020B0604030504040204" pitchFamily="34" charset="0"/>
+                <a:ea typeface="Verdana" panose="020B0604030504040204" pitchFamily="34" charset="0"/>
+                <a:cs typeface="Courier New" panose="02070309020205020404" pitchFamily="49" charset="0"/>
+              </a:rPr>
+              <a:t>. Ingerir com água. Repetir em momentos de crise.</a:t>
+            </a:r>
+          </a:p>
+          <a:p>
+            <a:pPr marL="571500" indent="-571500">
+              <a:buSzPct val="100000"/>
+              <a:buFont typeface="Arial" panose="020B0604020202020204" pitchFamily="34" charset="0"/>
+              <a:buChar char="•"/>
+            </a:pPr>
+            <a:r>
+              <a:rPr lang="pt-BR" sz="4000" dirty="0">
+                <a:cs typeface="Courier New" panose="02070309020205020404" pitchFamily="49" charset="0"/>
+              </a:rPr>
+              <a:t>Essa mesma ideia se aplica na OO. No caso, a complexidade que desejamos esconder é a de implementação de alguma necessidade. Com o encapsulamento, podemos esconder a forma como algo foi feito, dando a quem precisa apenas o resultado gerado.</a:t>
+            </a:r>
+          </a:p>
+          <a:p>
+            <a:pPr marL="571500" indent="-571500">
+              <a:buSzPct val="100000"/>
+              <a:buFont typeface="Arial" panose="020B0604020202020204" pitchFamily="34" charset="0"/>
+              <a:buChar char="•"/>
+            </a:pPr>
+            <a:r>
+              <a:rPr lang="pt-BR" sz="4000" dirty="0">
+                <a:cs typeface="Courier New" panose="02070309020205020404" pitchFamily="49" charset="0"/>
+              </a:rPr>
+              <a:t>Uma vantagem deste princípio é que as mudanças se tornam transparentes, ou seja, quem usa algum processamento não será afetado quando seu comportamento interno mudar.</a:t>
+            </a:r>
+          </a:p>
+        </p:txBody>
+      </p:sp>
+      <p:sp>
+        <p:nvSpPr>
+          <p:cNvPr id="7" name="Espaço Reservado para Número de Slide 6">
+            <a:extLst>
+              <a:ext uri="{FF2B5EF4-FFF2-40B4-BE49-F238E27FC236}">
+                <a16:creationId xmlns:a16="http://schemas.microsoft.com/office/drawing/2014/main" id="{40C5ECBA-0615-433C-B308-162C7F749201}"/>
+              </a:ext>
+            </a:extLst>
+          </p:cNvPr>
+          <p:cNvSpPr>
+            <a:spLocks noGrp="1"/>
+          </p:cNvSpPr>
+          <p:nvPr>
+            <p:ph type="sldNum" sz="quarter" idx="10"/>
+          </p:nvPr>
+        </p:nvSpPr>
+        <p:spPr/>
+        <p:txBody>
+          <a:bodyPr/>
+          <a:lstStyle/>
+          <a:p>
+            <a:fld id="{E4B35BDD-CC3D-4492-88ED-922B282360E3}" type="slidenum">
+              <a:rPr lang="pt-BR" smtClean="0"/>
+              <a:t>66</a:t>
+            </a:fld>
+            <a:endParaRPr lang="pt-BR"/>
+          </a:p>
+        </p:txBody>
+      </p:sp>
+    </p:spTree>
+    <p:extLst>
+      <p:ext uri="{BB962C8B-B14F-4D97-AF65-F5344CB8AC3E}">
+        <p14:creationId xmlns:p14="http://schemas.microsoft.com/office/powerpoint/2010/main" val="3955122196"/>
+      </p:ext>
+    </p:extLst>
+  </p:cSld>
+  <p:clrMapOvr>
+    <a:masterClrMapping/>
+  </p:clrMapOvr>
+  <p:transition spd="med"/>
+</p:sld>
+</file>
+
+<file path=ppt/slides/slide67.xml><?xml version="1.0" encoding="utf-8"?>
+<p:sld xmlns:a="http://schemas.openxmlformats.org/drawingml/2006/main" xmlns:r="http://schemas.openxmlformats.org/officeDocument/2006/relationships" xmlns:p="http://schemas.openxmlformats.org/presentationml/2006/main">
+  <p:cSld>
+    <p:spTree>
+      <p:nvGrpSpPr>
+        <p:cNvPr id="1" name=""/>
+        <p:cNvGrpSpPr/>
+        <p:nvPr/>
+      </p:nvGrpSpPr>
+      <p:grpSpPr>
+        <a:xfrm>
+          <a:off x="0" y="0"/>
+          <a:ext cx="0" cy="0"/>
+          <a:chOff x="0" y="0"/>
+          <a:chExt cx="0" cy="0"/>
+        </a:xfrm>
+      </p:grpSpPr>
+      <p:sp>
+        <p:nvSpPr>
+          <p:cNvPr id="4" name="Título 3">
+            <a:extLst>
+              <a:ext uri="{FF2B5EF4-FFF2-40B4-BE49-F238E27FC236}">
+                <a16:creationId xmlns:a16="http://schemas.microsoft.com/office/drawing/2014/main" id="{4D95FF0F-F271-48E7-A204-C5656918B6A3}"/>
+              </a:ext>
+            </a:extLst>
+          </p:cNvPr>
+          <p:cNvSpPr>
+            <a:spLocks noGrp="1"/>
+          </p:cNvSpPr>
+          <p:nvPr>
+            <p:ph type="title"/>
+          </p:nvPr>
+        </p:nvSpPr>
+        <p:spPr>
+          <a:xfrm>
+            <a:off x="1689100" y="4572000"/>
+            <a:ext cx="21005800" cy="2286000"/>
+          </a:xfrm>
+        </p:spPr>
+        <p:txBody>
+          <a:bodyPr anchor="ctr">
+            <a:noAutofit/>
+          </a:bodyPr>
+          <a:lstStyle/>
+          <a:p>
+            <a:pPr algn="ctr"/>
+            <a:r>
+              <a:rPr lang="pt-BR" sz="10100" dirty="0"/>
+              <a:t>Introdução a Java</a:t>
+            </a:r>
+          </a:p>
+        </p:txBody>
+      </p:sp>
+      <p:sp>
+        <p:nvSpPr>
+          <p:cNvPr id="3" name="Espaço Reservado para Número de Slide 2">
+            <a:extLst>
+              <a:ext uri="{FF2B5EF4-FFF2-40B4-BE49-F238E27FC236}">
+                <a16:creationId xmlns:a16="http://schemas.microsoft.com/office/drawing/2014/main" id="{0A64DBA4-BCFE-45E5-997E-0703CA3C03F1}"/>
+              </a:ext>
+            </a:extLst>
+          </p:cNvPr>
+          <p:cNvSpPr>
+            <a:spLocks noGrp="1"/>
+          </p:cNvSpPr>
+          <p:nvPr>
+            <p:ph type="sldNum" sz="quarter" idx="10"/>
+          </p:nvPr>
+        </p:nvSpPr>
+        <p:spPr/>
+        <p:txBody>
+          <a:bodyPr/>
+          <a:lstStyle/>
+          <a:p>
+            <a:fld id="{5D0C34D4-E406-4A74-B020-30BB69A49765}" type="slidenum">
+              <a:rPr lang="pt-BR" smtClean="0"/>
+              <a:pPr/>
+              <a:t>67</a:t>
+            </a:fld>
+            <a:endParaRPr lang="pt-BR" dirty="0"/>
+          </a:p>
+        </p:txBody>
+      </p:sp>
+      <p:sp>
+        <p:nvSpPr>
+          <p:cNvPr id="5" name="Seta: para a Esquerda 4">
+            <a:hlinkClick r:id="rId2" action="ppaction://hlinksldjump"/>
+            <a:extLst>
+              <a:ext uri="{FF2B5EF4-FFF2-40B4-BE49-F238E27FC236}">
+                <a16:creationId xmlns:a16="http://schemas.microsoft.com/office/drawing/2014/main" id="{FB1B9FE4-85B3-4444-8B9B-D63B0DA9614E}"/>
+              </a:ext>
+            </a:extLst>
+          </p:cNvPr>
+          <p:cNvSpPr/>
+          <p:nvPr/>
+        </p:nvSpPr>
+        <p:spPr>
+          <a:xfrm>
+            <a:off x="1428508" y="522995"/>
+            <a:ext cx="938463" cy="986589"/>
+          </a:xfrm>
+          <a:prstGeom prst="leftArrow">
+            <a:avLst/>
+          </a:prstGeom>
+          <a:solidFill>
+            <a:schemeClr val="accent1"/>
+          </a:solidFill>
+          <a:ln w="12700" cap="flat">
+            <a:noFill/>
+            <a:miter lim="400000"/>
+          </a:ln>
+          <a:effectLst/>
+          <a:sp3d/>
+        </p:spPr>
+        <p:style>
+          <a:lnRef idx="0">
+            <a:scrgbClr r="0" g="0" b="0"/>
+          </a:lnRef>
+          <a:fillRef idx="0">
+            <a:scrgbClr r="0" g="0" b="0"/>
+          </a:fillRef>
+          <a:effectRef idx="0">
+            <a:scrgbClr r="0" g="0" b="0"/>
+          </a:effectRef>
+          <a:fontRef idx="none"/>
+        </p:style>
+        <p:txBody>
+          <a:bodyPr rot="0" spcFirstLastPara="1" vertOverflow="overflow" horzOverflow="overflow" vert="horz" wrap="square" lIns="0" tIns="0" rIns="0" bIns="0" numCol="1" spcCol="38100" rtlCol="0" anchor="ctr">
+            <a:spAutoFit/>
+          </a:bodyPr>
+          <a:lstStyle/>
+          <a:p>
+            <a:pPr marL="0" marR="0" indent="0" algn="ctr" defTabSz="825500" rtl="0" fontAlgn="auto" latinLnBrk="0" hangingPunct="0">
+              <a:lnSpc>
+                <a:spcPct val="100000"/>
+              </a:lnSpc>
+              <a:spcBef>
+                <a:spcPts val="0"/>
+              </a:spcBef>
+              <a:spcAft>
+                <a:spcPts val="0"/>
+              </a:spcAft>
+              <a:buClrTx/>
+              <a:buSzTx/>
+              <a:buFontTx/>
+              <a:buNone/>
+              <a:tabLst/>
+            </a:pPr>
+            <a:endParaRPr kumimoji="0" lang="pt-BR" sz="3200" b="0" i="0" u="none" strike="noStrike" cap="none" spc="0" normalizeH="0" baseline="0">
+              <a:ln>
+                <a:noFill/>
+              </a:ln>
+              <a:solidFill>
+                <a:srgbClr val="FFFFFF"/>
+              </a:solidFill>
+              <a:effectLst/>
+              <a:uFillTx/>
+              <a:latin typeface="+mn-lt"/>
+              <a:ea typeface="+mn-ea"/>
+              <a:cs typeface="+mn-cs"/>
+              <a:sym typeface="Helvetica Neue Medium"/>
+            </a:endParaRPr>
+          </a:p>
+        </p:txBody>
+      </p:sp>
+    </p:spTree>
+    <p:extLst>
+      <p:ext uri="{BB962C8B-B14F-4D97-AF65-F5344CB8AC3E}">
+        <p14:creationId xmlns:p14="http://schemas.microsoft.com/office/powerpoint/2010/main" val="19382796"/>
+      </p:ext>
+    </p:extLst>
+  </p:cSld>
+  <p:clrMapOvr>
+    <a:masterClrMapping/>
+  </p:clrMapOvr>
+  <p:transition spd="med"/>
+</p:sld>
+</file>
+
+<file path=ppt/slides/slide68.xml><?xml version="1.0" encoding="utf-8"?>
+<p:sld xmlns:a="http://schemas.openxmlformats.org/drawingml/2006/main" xmlns:r="http://schemas.openxmlformats.org/officeDocument/2006/relationships" xmlns:p="http://schemas.openxmlformats.org/presentationml/2006/main">
+  <p:cSld>
+    <p:spTree>
+      <p:nvGrpSpPr>
+        <p:cNvPr id="1" name=""/>
+        <p:cNvGrpSpPr/>
+        <p:nvPr/>
+      </p:nvGrpSpPr>
+      <p:grpSpPr>
+        <a:xfrm>
+          <a:off x="0" y="0"/>
+          <a:ext cx="0" cy="0"/>
+          <a:chOff x="0" y="0"/>
+          <a:chExt cx="0" cy="0"/>
+        </a:xfrm>
+      </p:grpSpPr>
+      <p:sp>
+        <p:nvSpPr>
+          <p:cNvPr id="4" name="Título 3">
+            <a:extLst>
+              <a:ext uri="{FF2B5EF4-FFF2-40B4-BE49-F238E27FC236}">
+                <a16:creationId xmlns:a16="http://schemas.microsoft.com/office/drawing/2014/main" id="{8A4C52A0-42D9-47BB-966A-7FE92FDBFA2D}"/>
+              </a:ext>
+            </a:extLst>
+          </p:cNvPr>
+          <p:cNvSpPr>
+            <a:spLocks noGrp="1"/>
+          </p:cNvSpPr>
+          <p:nvPr>
+            <p:ph type="title"/>
+          </p:nvPr>
+        </p:nvSpPr>
+        <p:spPr/>
+        <p:txBody>
+          <a:bodyPr>
+            <a:normAutofit/>
+          </a:bodyPr>
+          <a:lstStyle/>
+          <a:p>
+            <a:r>
+              <a:rPr lang="pt-BR" dirty="0"/>
+              <a:t>O que é Java?</a:t>
+            </a:r>
+          </a:p>
+        </p:txBody>
+      </p:sp>
+      <p:sp>
+        <p:nvSpPr>
+          <p:cNvPr id="5" name="Espaço Reservado para Conteúdo 4">
+            <a:extLst>
+              <a:ext uri="{FF2B5EF4-FFF2-40B4-BE49-F238E27FC236}">
+                <a16:creationId xmlns:a16="http://schemas.microsoft.com/office/drawing/2014/main" id="{1FBD8255-54D1-42B3-9B71-2D45D227E6FC}"/>
+              </a:ext>
+            </a:extLst>
+          </p:cNvPr>
+          <p:cNvSpPr>
+            <a:spLocks noGrp="1"/>
+          </p:cNvSpPr>
+          <p:nvPr>
+            <p:ph type="body" idx="1"/>
+          </p:nvPr>
+        </p:nvSpPr>
+        <p:spPr>
+          <a:xfrm>
+            <a:off x="1689100" y="2604530"/>
+            <a:ext cx="21005800" cy="10609446"/>
+          </a:xfrm>
+          <a:solidFill>
+            <a:schemeClr val="bg1"/>
+          </a:solidFill>
+        </p:spPr>
+        <p:txBody>
+          <a:bodyPr>
+            <a:noAutofit/>
+          </a:bodyPr>
+          <a:lstStyle/>
+          <a:p>
+            <a:pPr>
+              <a:buSzPct val="100000"/>
+            </a:pPr>
+            <a:r>
+              <a:rPr lang="pt-BR" sz="4000" dirty="0">
+                <a:cs typeface="Courier New" panose="02070309020205020404" pitchFamily="49" charset="0"/>
+              </a:rPr>
+              <a:t>A linguagem Java começou a ser concebida no início da década de 1990, com o objetivo de resolver alguns dos problemas comuns em programação na época, tais como:</a:t>
+            </a:r>
+          </a:p>
+          <a:p>
+            <a:pPr marL="571500" indent="-571500">
+              <a:buSzPct val="100000"/>
+              <a:buFont typeface="Arial" panose="020B0604020202020204" pitchFamily="34" charset="0"/>
+              <a:buChar char="•"/>
+            </a:pPr>
+            <a:r>
+              <a:rPr lang="pt-BR" sz="4000" dirty="0">
+                <a:cs typeface="Courier New" panose="02070309020205020404" pitchFamily="49" charset="0"/>
+              </a:rPr>
+              <a:t>Uso de ponteiros;</a:t>
+            </a:r>
+          </a:p>
+          <a:p>
+            <a:pPr marL="571500" indent="-571500">
+              <a:buSzPct val="100000"/>
+              <a:buFont typeface="Arial" panose="020B0604020202020204" pitchFamily="34" charset="0"/>
+              <a:buChar char="•"/>
+            </a:pPr>
+            <a:r>
+              <a:rPr lang="pt-BR" sz="4000" dirty="0">
+                <a:cs typeface="Courier New" panose="02070309020205020404" pitchFamily="49" charset="0"/>
+              </a:rPr>
+              <a:t>Gerenciamento de memória;</a:t>
+            </a:r>
+          </a:p>
+          <a:p>
+            <a:pPr marL="571500" indent="-571500">
+              <a:buSzPct val="100000"/>
+              <a:buFont typeface="Arial" panose="020B0604020202020204" pitchFamily="34" charset="0"/>
+              <a:buChar char="•"/>
+            </a:pPr>
+            <a:r>
+              <a:rPr lang="pt-BR" sz="4000" dirty="0">
+                <a:cs typeface="Courier New" panose="02070309020205020404" pitchFamily="49" charset="0"/>
+              </a:rPr>
+              <a:t>Organização;</a:t>
+            </a:r>
+          </a:p>
+          <a:p>
+            <a:pPr marL="571500" indent="-571500">
+              <a:buSzPct val="100000"/>
+              <a:buFont typeface="Arial" panose="020B0604020202020204" pitchFamily="34" charset="0"/>
+              <a:buChar char="•"/>
+            </a:pPr>
+            <a:r>
+              <a:rPr lang="pt-BR" sz="4000" dirty="0">
+                <a:cs typeface="Courier New" panose="02070309020205020404" pitchFamily="49" charset="0"/>
+              </a:rPr>
+              <a:t>Falta de bibliotecas;</a:t>
+            </a:r>
+          </a:p>
+          <a:p>
+            <a:pPr marL="571500" indent="-571500">
+              <a:buSzPct val="100000"/>
+              <a:buFont typeface="Arial" panose="020B0604020202020204" pitchFamily="34" charset="0"/>
+              <a:buChar char="•"/>
+            </a:pPr>
+            <a:r>
+              <a:rPr lang="pt-BR" sz="4000" dirty="0">
+                <a:cs typeface="Courier New" panose="02070309020205020404" pitchFamily="49" charset="0"/>
+              </a:rPr>
+              <a:t>Necessidade de reescrever parte do código ao mudar de sistema operacional;</a:t>
+            </a:r>
+          </a:p>
+          <a:p>
+            <a:pPr marL="571500" indent="-571500">
+              <a:buSzPct val="100000"/>
+              <a:buFont typeface="Arial" panose="020B0604020202020204" pitchFamily="34" charset="0"/>
+              <a:buChar char="•"/>
+            </a:pPr>
+            <a:r>
+              <a:rPr lang="pt-BR" sz="4000" dirty="0">
+                <a:cs typeface="Courier New" panose="02070309020205020404" pitchFamily="49" charset="0"/>
+              </a:rPr>
+              <a:t>Custo financeiro de usar a tecnologia.</a:t>
+            </a:r>
+          </a:p>
+          <a:p>
+            <a:pPr>
+              <a:buSzPct val="100000"/>
+            </a:pPr>
+            <a:r>
+              <a:rPr lang="pt-BR" sz="4000" dirty="0">
+                <a:cs typeface="Courier New" panose="02070309020205020404" pitchFamily="49" charset="0"/>
+              </a:rPr>
+              <a:t>Uma das grandes motivações para a criação da plataforma Java era de que essa linguagem fosse usada em pequenos dispositivos, como TVs. Apesar disso a linguagem teve seu lançamento focado no uso em clientes web (browsers) para rodar pequenas aplicações (</a:t>
+            </a:r>
+            <a:r>
+              <a:rPr lang="pt-BR" sz="4000" dirty="0" err="1">
+                <a:cs typeface="Courier New" panose="02070309020205020404" pitchFamily="49" charset="0"/>
+              </a:rPr>
+              <a:t>applets</a:t>
+            </a:r>
+            <a:r>
+              <a:rPr lang="pt-BR" sz="4000" dirty="0">
+                <a:cs typeface="Courier New" panose="02070309020205020404" pitchFamily="49" charset="0"/>
+              </a:rPr>
+              <a:t>). Hoje em dia esse não é o grande mercado do Java: apesar de ter sido idealizado com um propósito e lançado com outro, o Java ganhou destaque no lado do servidor.</a:t>
+            </a:r>
+          </a:p>
+        </p:txBody>
+      </p:sp>
+      <p:sp>
+        <p:nvSpPr>
+          <p:cNvPr id="7" name="Espaço Reservado para Número de Slide 6">
+            <a:extLst>
+              <a:ext uri="{FF2B5EF4-FFF2-40B4-BE49-F238E27FC236}">
+                <a16:creationId xmlns:a16="http://schemas.microsoft.com/office/drawing/2014/main" id="{40C5ECBA-0615-433C-B308-162C7F749201}"/>
+              </a:ext>
+            </a:extLst>
+          </p:cNvPr>
+          <p:cNvSpPr>
+            <a:spLocks noGrp="1"/>
+          </p:cNvSpPr>
+          <p:nvPr>
+            <p:ph type="sldNum" sz="quarter" idx="10"/>
+          </p:nvPr>
+        </p:nvSpPr>
+        <p:spPr/>
+        <p:txBody>
+          <a:bodyPr/>
+          <a:lstStyle/>
+          <a:p>
+            <a:fld id="{E4B35BDD-CC3D-4492-88ED-922B282360E3}" type="slidenum">
+              <a:rPr lang="pt-BR" smtClean="0"/>
+              <a:t>68</a:t>
+            </a:fld>
+            <a:endParaRPr lang="pt-BR"/>
+          </a:p>
+        </p:txBody>
+      </p:sp>
+    </p:spTree>
+    <p:extLst>
+      <p:ext uri="{BB962C8B-B14F-4D97-AF65-F5344CB8AC3E}">
+        <p14:creationId xmlns:p14="http://schemas.microsoft.com/office/powerpoint/2010/main" val="2244862162"/>
+      </p:ext>
+    </p:extLst>
+  </p:cSld>
+  <p:clrMapOvr>
+    <a:masterClrMapping/>
+  </p:clrMapOvr>
+  <p:transition spd="med"/>
+</p:sld>
+</file>
+
+<file path=ppt/slides/slide69.xml><?xml version="1.0" encoding="utf-8"?>
+<p:sld xmlns:a="http://schemas.openxmlformats.org/drawingml/2006/main" xmlns:r="http://schemas.openxmlformats.org/officeDocument/2006/relationships" xmlns:p="http://schemas.openxmlformats.org/presentationml/2006/main">
+  <p:cSld>
+    <p:spTree>
+      <p:nvGrpSpPr>
+        <p:cNvPr id="1" name=""/>
+        <p:cNvGrpSpPr/>
+        <p:nvPr/>
+      </p:nvGrpSpPr>
+      <p:grpSpPr>
+        <a:xfrm>
+          <a:off x="0" y="0"/>
+          <a:ext cx="0" cy="0"/>
+          <a:chOff x="0" y="0"/>
+          <a:chExt cx="0" cy="0"/>
+        </a:xfrm>
+      </p:grpSpPr>
+      <p:sp>
+        <p:nvSpPr>
+          <p:cNvPr id="4" name="Título 3">
+            <a:extLst>
+              <a:ext uri="{FF2B5EF4-FFF2-40B4-BE49-F238E27FC236}">
+                <a16:creationId xmlns:a16="http://schemas.microsoft.com/office/drawing/2014/main" id="{8A4C52A0-42D9-47BB-966A-7FE92FDBFA2D}"/>
+              </a:ext>
+            </a:extLst>
+          </p:cNvPr>
+          <p:cNvSpPr>
+            <a:spLocks noGrp="1"/>
+          </p:cNvSpPr>
+          <p:nvPr>
+            <p:ph type="title"/>
+          </p:nvPr>
+        </p:nvSpPr>
+        <p:spPr/>
+        <p:txBody>
+          <a:bodyPr>
+            <a:normAutofit/>
+          </a:bodyPr>
+          <a:lstStyle/>
+          <a:p>
+            <a:r>
+              <a:rPr lang="pt-BR" dirty="0"/>
+              <a:t>Uma breve história</a:t>
+            </a:r>
+          </a:p>
+        </p:txBody>
+      </p:sp>
+      <p:sp>
+        <p:nvSpPr>
+          <p:cNvPr id="5" name="Espaço Reservado para Conteúdo 4">
+            <a:extLst>
+              <a:ext uri="{FF2B5EF4-FFF2-40B4-BE49-F238E27FC236}">
+                <a16:creationId xmlns:a16="http://schemas.microsoft.com/office/drawing/2014/main" id="{1FBD8255-54D1-42B3-9B71-2D45D227E6FC}"/>
+              </a:ext>
+            </a:extLst>
+          </p:cNvPr>
+          <p:cNvSpPr>
+            <a:spLocks noGrp="1"/>
+          </p:cNvSpPr>
+          <p:nvPr>
+            <p:ph type="body" idx="1"/>
+          </p:nvPr>
+        </p:nvSpPr>
+        <p:spPr>
+          <a:xfrm>
+            <a:off x="1689100" y="2604530"/>
+            <a:ext cx="21005800" cy="10609446"/>
+          </a:xfrm>
+          <a:solidFill>
+            <a:schemeClr val="bg1"/>
+          </a:solidFill>
+        </p:spPr>
+        <p:txBody>
+          <a:bodyPr>
+            <a:noAutofit/>
+          </a:bodyPr>
+          <a:lstStyle/>
+          <a:p>
+            <a:pPr marL="571500" indent="-571500">
+              <a:buSzPct val="100000"/>
+              <a:buFont typeface="Arial" panose="020B0604020202020204" pitchFamily="34" charset="0"/>
+              <a:buChar char="•"/>
+            </a:pPr>
+            <a:r>
+              <a:rPr lang="pt-BR" sz="4000" dirty="0">
+                <a:cs typeface="Courier New" panose="02070309020205020404" pitchFamily="49" charset="0"/>
+              </a:rPr>
+              <a:t>Time criado em 1992 na Sun, liderado por James Gosling, considerado o pai do Java.</a:t>
+            </a:r>
+          </a:p>
+          <a:p>
+            <a:pPr marL="571500" indent="-571500">
+              <a:buSzPct val="100000"/>
+              <a:buFont typeface="Arial" panose="020B0604020202020204" pitchFamily="34" charset="0"/>
+              <a:buChar char="•"/>
+            </a:pPr>
+            <a:r>
+              <a:rPr lang="pt-BR" sz="4000" dirty="0">
+                <a:cs typeface="Courier New" panose="02070309020205020404" pitchFamily="49" charset="0"/>
+              </a:rPr>
+              <a:t>Ideia inicial de criar um interpretador para pequenos dispositivos, facilitando a reescrita de software para aparelhos eletrônicos.</a:t>
+            </a:r>
+          </a:p>
+          <a:p>
+            <a:pPr marL="571500" indent="-571500">
+              <a:buSzPct val="100000"/>
+              <a:buFont typeface="Arial" panose="020B0604020202020204" pitchFamily="34" charset="0"/>
+              <a:buChar char="•"/>
+            </a:pPr>
+            <a:r>
+              <a:rPr lang="pt-BR" sz="4000" dirty="0">
+                <a:cs typeface="Courier New" panose="02070309020205020404" pitchFamily="49" charset="0"/>
+              </a:rPr>
+              <a:t>A ideia não deu certo, devido ao conflito de interesses e custos.</a:t>
+            </a:r>
+          </a:p>
+          <a:p>
+            <a:pPr marL="571500" indent="-571500">
+              <a:buSzPct val="100000"/>
+              <a:buFont typeface="Arial" panose="020B0604020202020204" pitchFamily="34" charset="0"/>
+              <a:buChar char="•"/>
+            </a:pPr>
+            <a:r>
+              <a:rPr lang="pt-BR" sz="4000" dirty="0">
+                <a:cs typeface="Courier New" panose="02070309020205020404" pitchFamily="49" charset="0"/>
+              </a:rPr>
+              <a:t>Hoje, sabemos que o Java domina o mercado de aplicações para celulares com mais de 2.5 bilhões de dispositivos compatíveis, porém em 1994 ainda era muito cedo para isso.</a:t>
+            </a:r>
+          </a:p>
+          <a:p>
+            <a:pPr marL="571500" indent="-571500">
+              <a:buSzPct val="100000"/>
+              <a:buFont typeface="Arial" panose="020B0604020202020204" pitchFamily="34" charset="0"/>
+              <a:buChar char="•"/>
+            </a:pPr>
+            <a:r>
+              <a:rPr lang="pt-BR" sz="4000" dirty="0">
+                <a:cs typeface="Courier New" panose="02070309020205020404" pitchFamily="49" charset="0"/>
+              </a:rPr>
+              <a:t>Com o advento da web, a ideia pode ser reaproveitada, já que na internet havia uma grande quantidade de sistemas operacionais e browsers, e com isso seria grande vantagem poder programar numa única linguagem, independente da plataforma.</a:t>
+            </a:r>
+          </a:p>
+          <a:p>
+            <a:pPr marL="571500" indent="-571500">
+              <a:buSzPct val="100000"/>
+              <a:buFont typeface="Arial" panose="020B0604020202020204" pitchFamily="34" charset="0"/>
+              <a:buChar char="•"/>
+            </a:pPr>
+            <a:r>
+              <a:rPr lang="pt-BR" sz="4000" dirty="0">
+                <a:cs typeface="Courier New" panose="02070309020205020404" pitchFamily="49" charset="0"/>
+              </a:rPr>
+              <a:t>O Java 1.0 foi lançado focado em transformar o browser de apenas um terminal “burro” em uma aplicação que possa também realizar operações avançadas, e não apenas renderizar HTML.</a:t>
+            </a:r>
+          </a:p>
+          <a:p>
+            <a:pPr marL="571500" indent="-571500">
+              <a:buSzPct val="100000"/>
+              <a:buFont typeface="Arial" panose="020B0604020202020204" pitchFamily="34" charset="0"/>
+              <a:buChar char="•"/>
+            </a:pPr>
+            <a:r>
+              <a:rPr lang="pt-BR" sz="4000" dirty="0">
+                <a:cs typeface="Courier New" panose="02070309020205020404" pitchFamily="49" charset="0"/>
+              </a:rPr>
+              <a:t>Em 2009 a Oracle comprou a Sun e fortaleceu a marca e a plataforma Java.</a:t>
+            </a:r>
+          </a:p>
+        </p:txBody>
+      </p:sp>
+      <p:sp>
+        <p:nvSpPr>
+          <p:cNvPr id="7" name="Espaço Reservado para Número de Slide 6">
+            <a:extLst>
+              <a:ext uri="{FF2B5EF4-FFF2-40B4-BE49-F238E27FC236}">
+                <a16:creationId xmlns:a16="http://schemas.microsoft.com/office/drawing/2014/main" id="{40C5ECBA-0615-433C-B308-162C7F749201}"/>
+              </a:ext>
+            </a:extLst>
+          </p:cNvPr>
+          <p:cNvSpPr>
+            <a:spLocks noGrp="1"/>
+          </p:cNvSpPr>
+          <p:nvPr>
+            <p:ph type="sldNum" sz="quarter" idx="10"/>
+          </p:nvPr>
+        </p:nvSpPr>
+        <p:spPr/>
+        <p:txBody>
+          <a:bodyPr/>
+          <a:lstStyle/>
+          <a:p>
+            <a:fld id="{E4B35BDD-CC3D-4492-88ED-922B282360E3}" type="slidenum">
+              <a:rPr lang="pt-BR" smtClean="0"/>
+              <a:t>69</a:t>
+            </a:fld>
+            <a:endParaRPr lang="pt-BR"/>
+          </a:p>
+        </p:txBody>
+      </p:sp>
+    </p:spTree>
+    <p:extLst>
+      <p:ext uri="{BB962C8B-B14F-4D97-AF65-F5344CB8AC3E}">
+        <p14:creationId xmlns:p14="http://schemas.microsoft.com/office/powerpoint/2010/main" val="3075461399"/>
+      </p:ext>
+    </p:extLst>
+  </p:cSld>
+  <p:clrMapOvr>
+    <a:masterClrMapping/>
+  </p:clrMapOvr>
+  <p:transition spd="med"/>
+</p:sld>
+</file>
+
 <file path=ppt/slides/slide7.xml><?xml version="1.0" encoding="utf-8"?>
 <p:sld xmlns:a="http://schemas.openxmlformats.org/drawingml/2006/main" xmlns:r="http://schemas.openxmlformats.org/officeDocument/2006/relationships" xmlns:p="http://schemas.openxmlformats.org/presentationml/2006/main">
   <p:cSld>
@@ -22135,6 +24654,951 @@
         <p14:creationId xmlns:p14="http://schemas.microsoft.com/office/powerpoint/2010/main" val="2355502600"/>
       </p:ext>
     </p:extLst>
+  </p:cSld>
+  <p:clrMapOvr>
+    <a:masterClrMapping/>
+  </p:clrMapOvr>
+  <p:transition spd="med"/>
+</p:sld>
+</file>
+
+<file path=ppt/slides/slide70.xml><?xml version="1.0" encoding="utf-8"?>
+<p:sld xmlns:a="http://schemas.openxmlformats.org/drawingml/2006/main" xmlns:r="http://schemas.openxmlformats.org/officeDocument/2006/relationships" xmlns:p="http://schemas.openxmlformats.org/presentationml/2006/main">
+  <p:cSld>
+    <p:spTree>
+      <p:nvGrpSpPr>
+        <p:cNvPr id="1" name=""/>
+        <p:cNvGrpSpPr/>
+        <p:nvPr/>
+      </p:nvGrpSpPr>
+      <p:grpSpPr>
+        <a:xfrm>
+          <a:off x="0" y="0"/>
+          <a:ext cx="0" cy="0"/>
+          <a:chOff x="0" y="0"/>
+          <a:chExt cx="0" cy="0"/>
+        </a:xfrm>
+      </p:grpSpPr>
+      <p:sp>
+        <p:nvSpPr>
+          <p:cNvPr id="4" name="Título 3">
+            <a:extLst>
+              <a:ext uri="{FF2B5EF4-FFF2-40B4-BE49-F238E27FC236}">
+                <a16:creationId xmlns:a16="http://schemas.microsoft.com/office/drawing/2014/main" id="{8A4C52A0-42D9-47BB-966A-7FE92FDBFA2D}"/>
+              </a:ext>
+            </a:extLst>
+          </p:cNvPr>
+          <p:cNvSpPr>
+            <a:spLocks noGrp="1"/>
+          </p:cNvSpPr>
+          <p:nvPr>
+            <p:ph type="title"/>
+          </p:nvPr>
+        </p:nvSpPr>
+        <p:spPr/>
+        <p:txBody>
+          <a:bodyPr>
+            <a:normAutofit/>
+          </a:bodyPr>
+          <a:lstStyle/>
+          <a:p>
+            <a:r>
+              <a:rPr lang="pt-BR" dirty="0"/>
+              <a:t>Máquina virtual?</a:t>
+            </a:r>
+          </a:p>
+        </p:txBody>
+      </p:sp>
+      <p:sp>
+        <p:nvSpPr>
+          <p:cNvPr id="5" name="Espaço Reservado para Conteúdo 4">
+            <a:extLst>
+              <a:ext uri="{FF2B5EF4-FFF2-40B4-BE49-F238E27FC236}">
+                <a16:creationId xmlns:a16="http://schemas.microsoft.com/office/drawing/2014/main" id="{1FBD8255-54D1-42B3-9B71-2D45D227E6FC}"/>
+              </a:ext>
+            </a:extLst>
+          </p:cNvPr>
+          <p:cNvSpPr>
+            <a:spLocks noGrp="1"/>
+          </p:cNvSpPr>
+          <p:nvPr>
+            <p:ph type="body" idx="1"/>
+          </p:nvPr>
+        </p:nvSpPr>
+        <p:spPr>
+          <a:xfrm>
+            <a:off x="1689100" y="2604530"/>
+            <a:ext cx="21005800" cy="10609446"/>
+          </a:xfrm>
+          <a:solidFill>
+            <a:schemeClr val="bg1"/>
+          </a:solidFill>
+        </p:spPr>
+        <p:txBody>
+          <a:bodyPr>
+            <a:noAutofit/>
+          </a:bodyPr>
+          <a:lstStyle/>
+          <a:p>
+            <a:pPr marL="571500" indent="-571500">
+              <a:buSzPct val="100000"/>
+              <a:buFont typeface="Arial" panose="020B0604020202020204" pitchFamily="34" charset="0"/>
+              <a:buChar char="•"/>
+            </a:pPr>
+            <a:endParaRPr lang="pt-BR" sz="4000" dirty="0">
+              <a:cs typeface="Courier New" panose="02070309020205020404" pitchFamily="49" charset="0"/>
+            </a:endParaRPr>
+          </a:p>
+        </p:txBody>
+      </p:sp>
+      <p:sp>
+        <p:nvSpPr>
+          <p:cNvPr id="7" name="Espaço Reservado para Número de Slide 6">
+            <a:extLst>
+              <a:ext uri="{FF2B5EF4-FFF2-40B4-BE49-F238E27FC236}">
+                <a16:creationId xmlns:a16="http://schemas.microsoft.com/office/drawing/2014/main" id="{40C5ECBA-0615-433C-B308-162C7F749201}"/>
+              </a:ext>
+            </a:extLst>
+          </p:cNvPr>
+          <p:cNvSpPr>
+            <a:spLocks noGrp="1"/>
+          </p:cNvSpPr>
+          <p:nvPr>
+            <p:ph type="sldNum" sz="quarter" idx="10"/>
+          </p:nvPr>
+        </p:nvSpPr>
+        <p:spPr/>
+        <p:txBody>
+          <a:bodyPr/>
+          <a:lstStyle/>
+          <a:p>
+            <a:fld id="{E4B35BDD-CC3D-4492-88ED-922B282360E3}" type="slidenum">
+              <a:rPr lang="pt-BR" smtClean="0"/>
+              <a:t>70</a:t>
+            </a:fld>
+            <a:endParaRPr lang="pt-BR"/>
+          </a:p>
+        </p:txBody>
+      </p:sp>
+      <p:pic>
+        <p:nvPicPr>
+          <p:cNvPr id="3" name="Imagem 2">
+            <a:extLst>
+              <a:ext uri="{FF2B5EF4-FFF2-40B4-BE49-F238E27FC236}">
+                <a16:creationId xmlns:a16="http://schemas.microsoft.com/office/drawing/2014/main" id="{A23A24F0-558B-433C-8768-881D4EBCB122}"/>
+              </a:ext>
+            </a:extLst>
+          </p:cNvPr>
+          <p:cNvPicPr>
+            <a:picLocks noChangeAspect="1"/>
+          </p:cNvPicPr>
+          <p:nvPr/>
+        </p:nvPicPr>
+        <p:blipFill>
+          <a:blip r:embed="rId2">
+            <a:extLst>
+              <a:ext uri="{28A0092B-C50C-407E-A947-70E740481C1C}">
+                <a14:useLocalDpi xmlns:a14="http://schemas.microsoft.com/office/drawing/2010/main" val="0"/>
+              </a:ext>
+            </a:extLst>
+          </a:blip>
+          <a:stretch>
+            <a:fillRect/>
+          </a:stretch>
+        </p:blipFill>
+        <p:spPr>
+          <a:xfrm>
+            <a:off x="1689100" y="4058473"/>
+            <a:ext cx="7953654" cy="1477110"/>
+          </a:xfrm>
+          <a:prstGeom prst="rect">
+            <a:avLst/>
+          </a:prstGeom>
+        </p:spPr>
+      </p:pic>
+      <p:pic>
+        <p:nvPicPr>
+          <p:cNvPr id="8" name="Imagem 7">
+            <a:extLst>
+              <a:ext uri="{FF2B5EF4-FFF2-40B4-BE49-F238E27FC236}">
+                <a16:creationId xmlns:a16="http://schemas.microsoft.com/office/drawing/2014/main" id="{EE083C92-F250-461A-A506-D04FFCC5D742}"/>
+              </a:ext>
+            </a:extLst>
+          </p:cNvPr>
+          <p:cNvPicPr>
+            <a:picLocks noChangeAspect="1"/>
+          </p:cNvPicPr>
+          <p:nvPr/>
+        </p:nvPicPr>
+        <p:blipFill>
+          <a:blip r:embed="rId3">
+            <a:extLst>
+              <a:ext uri="{28A0092B-C50C-407E-A947-70E740481C1C}">
+                <a14:useLocalDpi xmlns:a14="http://schemas.microsoft.com/office/drawing/2010/main" val="0"/>
+              </a:ext>
+            </a:extLst>
+          </a:blip>
+          <a:stretch>
+            <a:fillRect/>
+          </a:stretch>
+        </p:blipFill>
+        <p:spPr>
+          <a:xfrm>
+            <a:off x="15473484" y="2248930"/>
+            <a:ext cx="7221416" cy="5096196"/>
+          </a:xfrm>
+          <a:prstGeom prst="rect">
+            <a:avLst/>
+          </a:prstGeom>
+        </p:spPr>
+      </p:pic>
+      <p:sp>
+        <p:nvSpPr>
+          <p:cNvPr id="9" name="Seta: para a Direita 8">
+            <a:extLst>
+              <a:ext uri="{FF2B5EF4-FFF2-40B4-BE49-F238E27FC236}">
+                <a16:creationId xmlns:a16="http://schemas.microsoft.com/office/drawing/2014/main" id="{ED722B25-407E-4EBB-AB8F-88CB9E13F8E9}"/>
+              </a:ext>
+            </a:extLst>
+          </p:cNvPr>
+          <p:cNvSpPr/>
+          <p:nvPr/>
+        </p:nvSpPr>
+        <p:spPr>
+          <a:xfrm>
+            <a:off x="10884423" y="4212018"/>
+            <a:ext cx="3516923" cy="1170019"/>
+          </a:xfrm>
+          <a:prstGeom prst="rightArrow">
+            <a:avLst/>
+          </a:prstGeom>
+          <a:solidFill>
+            <a:schemeClr val="accent1"/>
+          </a:solidFill>
+          <a:ln w="12700" cap="flat">
+            <a:noFill/>
+            <a:miter lim="400000"/>
+          </a:ln>
+          <a:effectLst/>
+          <a:sp3d/>
+        </p:spPr>
+        <p:style>
+          <a:lnRef idx="0">
+            <a:scrgbClr r="0" g="0" b="0"/>
+          </a:lnRef>
+          <a:fillRef idx="0">
+            <a:scrgbClr r="0" g="0" b="0"/>
+          </a:fillRef>
+          <a:effectRef idx="0">
+            <a:scrgbClr r="0" g="0" b="0"/>
+          </a:effectRef>
+          <a:fontRef idx="none"/>
+        </p:style>
+        <p:txBody>
+          <a:bodyPr rot="0" spcFirstLastPara="1" vertOverflow="overflow" horzOverflow="overflow" vert="horz" wrap="square" lIns="0" tIns="0" rIns="0" bIns="0" numCol="1" spcCol="38100" rtlCol="0" anchor="ctr">
+            <a:spAutoFit/>
+          </a:bodyPr>
+          <a:lstStyle/>
+          <a:p>
+            <a:pPr marL="0" marR="0" indent="0" algn="ctr" defTabSz="825500" rtl="0" fontAlgn="auto" latinLnBrk="0" hangingPunct="0">
+              <a:lnSpc>
+                <a:spcPct val="100000"/>
+              </a:lnSpc>
+              <a:spcBef>
+                <a:spcPts val="0"/>
+              </a:spcBef>
+              <a:spcAft>
+                <a:spcPts val="0"/>
+              </a:spcAft>
+              <a:buClrTx/>
+              <a:buSzTx/>
+              <a:buFontTx/>
+              <a:buNone/>
+              <a:tabLst/>
+            </a:pPr>
+            <a:endParaRPr kumimoji="0" lang="pt-BR" sz="3200" b="0" i="0" u="none" strike="noStrike" cap="none" spc="0" normalizeH="0" baseline="0">
+              <a:ln>
+                <a:noFill/>
+              </a:ln>
+              <a:solidFill>
+                <a:srgbClr val="FFFFFF"/>
+              </a:solidFill>
+              <a:effectLst/>
+              <a:uFillTx/>
+              <a:latin typeface="+mn-lt"/>
+              <a:ea typeface="+mn-ea"/>
+              <a:cs typeface="+mn-cs"/>
+              <a:sym typeface="Helvetica Neue Medium"/>
+            </a:endParaRPr>
+          </a:p>
+        </p:txBody>
+      </p:sp>
+      <p:pic>
+        <p:nvPicPr>
+          <p:cNvPr id="11" name="Imagem 10">
+            <a:extLst>
+              <a:ext uri="{FF2B5EF4-FFF2-40B4-BE49-F238E27FC236}">
+                <a16:creationId xmlns:a16="http://schemas.microsoft.com/office/drawing/2014/main" id="{E8701CF2-B2C1-47BB-83E1-9466DCCC12C0}"/>
+              </a:ext>
+            </a:extLst>
+          </p:cNvPr>
+          <p:cNvPicPr>
+            <a:picLocks noChangeAspect="1"/>
+          </p:cNvPicPr>
+          <p:nvPr/>
+        </p:nvPicPr>
+        <p:blipFill>
+          <a:blip r:embed="rId4">
+            <a:extLst>
+              <a:ext uri="{28A0092B-C50C-407E-A947-70E740481C1C}">
+                <a14:useLocalDpi xmlns:a14="http://schemas.microsoft.com/office/drawing/2010/main" val="0"/>
+              </a:ext>
+            </a:extLst>
+          </a:blip>
+          <a:stretch>
+            <a:fillRect/>
+          </a:stretch>
+        </p:blipFill>
+        <p:spPr>
+          <a:xfrm>
+            <a:off x="7639696" y="7618413"/>
+            <a:ext cx="9104608" cy="5322276"/>
+          </a:xfrm>
+          <a:prstGeom prst="rect">
+            <a:avLst/>
+          </a:prstGeom>
+        </p:spPr>
+      </p:pic>
+    </p:spTree>
+    <p:extLst>
+      <p:ext uri="{BB962C8B-B14F-4D97-AF65-F5344CB8AC3E}">
+        <p14:creationId xmlns:p14="http://schemas.microsoft.com/office/powerpoint/2010/main" val="1181271026"/>
+      </p:ext>
+    </p:extLst>
+  </p:cSld>
+  <p:clrMapOvr>
+    <a:masterClrMapping/>
+  </p:clrMapOvr>
+  <p:transition spd="med"/>
+</p:sld>
+</file>
+
+<file path=ppt/slides/slide71.xml><?xml version="1.0" encoding="utf-8"?>
+<p:sld xmlns:a="http://schemas.openxmlformats.org/drawingml/2006/main" xmlns:r="http://schemas.openxmlformats.org/officeDocument/2006/relationships" xmlns:p="http://schemas.openxmlformats.org/presentationml/2006/main">
+  <p:cSld>
+    <p:spTree>
+      <p:nvGrpSpPr>
+        <p:cNvPr id="1" name=""/>
+        <p:cNvGrpSpPr/>
+        <p:nvPr/>
+      </p:nvGrpSpPr>
+      <p:grpSpPr>
+        <a:xfrm>
+          <a:off x="0" y="0"/>
+          <a:ext cx="0" cy="0"/>
+          <a:chOff x="0" y="0"/>
+          <a:chExt cx="0" cy="0"/>
+        </a:xfrm>
+      </p:grpSpPr>
+      <p:sp>
+        <p:nvSpPr>
+          <p:cNvPr id="4" name="Título 3">
+            <a:extLst>
+              <a:ext uri="{FF2B5EF4-FFF2-40B4-BE49-F238E27FC236}">
+                <a16:creationId xmlns:a16="http://schemas.microsoft.com/office/drawing/2014/main" id="{8A4C52A0-42D9-47BB-966A-7FE92FDBFA2D}"/>
+              </a:ext>
+            </a:extLst>
+          </p:cNvPr>
+          <p:cNvSpPr>
+            <a:spLocks noGrp="1"/>
+          </p:cNvSpPr>
+          <p:nvPr>
+            <p:ph type="title"/>
+          </p:nvPr>
+        </p:nvSpPr>
+        <p:spPr/>
+        <p:txBody>
+          <a:bodyPr>
+            <a:normAutofit/>
+          </a:bodyPr>
+          <a:lstStyle/>
+          <a:p>
+            <a:r>
+              <a:rPr lang="pt-BR" dirty="0"/>
+              <a:t>Máquina virtual?</a:t>
+            </a:r>
+          </a:p>
+        </p:txBody>
+      </p:sp>
+      <p:sp>
+        <p:nvSpPr>
+          <p:cNvPr id="5" name="Espaço Reservado para Conteúdo 4">
+            <a:extLst>
+              <a:ext uri="{FF2B5EF4-FFF2-40B4-BE49-F238E27FC236}">
+                <a16:creationId xmlns:a16="http://schemas.microsoft.com/office/drawing/2014/main" id="{1FBD8255-54D1-42B3-9B71-2D45D227E6FC}"/>
+              </a:ext>
+            </a:extLst>
+          </p:cNvPr>
+          <p:cNvSpPr>
+            <a:spLocks noGrp="1"/>
+          </p:cNvSpPr>
+          <p:nvPr>
+            <p:ph type="body" idx="1"/>
+          </p:nvPr>
+        </p:nvSpPr>
+        <p:spPr>
+          <a:xfrm>
+            <a:off x="1689100" y="2604530"/>
+            <a:ext cx="21005800" cy="10609446"/>
+          </a:xfrm>
+          <a:solidFill>
+            <a:schemeClr val="bg1"/>
+          </a:solidFill>
+        </p:spPr>
+        <p:txBody>
+          <a:bodyPr>
+            <a:noAutofit/>
+          </a:bodyPr>
+          <a:lstStyle/>
+          <a:p>
+            <a:pPr>
+              <a:buSzPct val="100000"/>
+            </a:pPr>
+            <a:r>
+              <a:rPr lang="pt-BR" sz="4000" dirty="0">
+                <a:cs typeface="Courier New" panose="02070309020205020404" pitchFamily="49" charset="0"/>
+              </a:rPr>
+              <a:t>O conceito de máquina virtual é bem mais amplo que o de um interpretador:</a:t>
+            </a:r>
+          </a:p>
+          <a:p>
+            <a:pPr marL="571500" indent="-571500">
+              <a:buSzPct val="100000"/>
+              <a:buFont typeface="Arial" panose="020B0604020202020204" pitchFamily="34" charset="0"/>
+              <a:buChar char="•"/>
+            </a:pPr>
+            <a:r>
+              <a:rPr lang="pt-BR" sz="4000" dirty="0">
+                <a:cs typeface="Courier New" panose="02070309020205020404" pitchFamily="49" charset="0"/>
+              </a:rPr>
+              <a:t>Uma VM tem tudo que um computador tem: é responsável por gerenciar memória, threads, a pilha de execução, etc.</a:t>
+            </a:r>
+          </a:p>
+          <a:p>
+            <a:pPr marL="571500" indent="-571500">
+              <a:buSzPct val="100000"/>
+              <a:buFont typeface="Arial" panose="020B0604020202020204" pitchFamily="34" charset="0"/>
+              <a:buChar char="•"/>
+            </a:pPr>
+            <a:r>
+              <a:rPr lang="pt-BR" sz="4000" dirty="0">
+                <a:cs typeface="Courier New" panose="02070309020205020404" pitchFamily="49" charset="0"/>
+              </a:rPr>
+              <a:t>Sua aplicação roda sem nenhum envolvimento com o sistema operacional, então a JVM pode tirar métricas, decidir onde é melhor alocar a memória, entre outros. </a:t>
+            </a:r>
+          </a:p>
+          <a:p>
+            <a:pPr marL="571500" indent="-571500">
+              <a:buSzPct val="100000"/>
+              <a:buFont typeface="Arial" panose="020B0604020202020204" pitchFamily="34" charset="0"/>
+              <a:buChar char="•"/>
+            </a:pPr>
+            <a:r>
+              <a:rPr lang="pt-BR" sz="4000" dirty="0">
+                <a:cs typeface="Courier New" panose="02070309020205020404" pitchFamily="49" charset="0"/>
+              </a:rPr>
+              <a:t>Se uma JVM termina abruptamente, só as aplicações que estavam rodando nela irão terminar.</a:t>
+            </a:r>
+          </a:p>
+        </p:txBody>
+      </p:sp>
+      <p:sp>
+        <p:nvSpPr>
+          <p:cNvPr id="7" name="Espaço Reservado para Número de Slide 6">
+            <a:extLst>
+              <a:ext uri="{FF2B5EF4-FFF2-40B4-BE49-F238E27FC236}">
+                <a16:creationId xmlns:a16="http://schemas.microsoft.com/office/drawing/2014/main" id="{40C5ECBA-0615-433C-B308-162C7F749201}"/>
+              </a:ext>
+            </a:extLst>
+          </p:cNvPr>
+          <p:cNvSpPr>
+            <a:spLocks noGrp="1"/>
+          </p:cNvSpPr>
+          <p:nvPr>
+            <p:ph type="sldNum" sz="quarter" idx="10"/>
+          </p:nvPr>
+        </p:nvSpPr>
+        <p:spPr/>
+        <p:txBody>
+          <a:bodyPr/>
+          <a:lstStyle/>
+          <a:p>
+            <a:fld id="{E4B35BDD-CC3D-4492-88ED-922B282360E3}" type="slidenum">
+              <a:rPr lang="pt-BR" smtClean="0"/>
+              <a:t>71</a:t>
+            </a:fld>
+            <a:endParaRPr lang="pt-BR"/>
+          </a:p>
+        </p:txBody>
+      </p:sp>
+    </p:spTree>
+    <p:extLst>
+      <p:ext uri="{BB962C8B-B14F-4D97-AF65-F5344CB8AC3E}">
+        <p14:creationId xmlns:p14="http://schemas.microsoft.com/office/powerpoint/2010/main" val="2336100389"/>
+      </p:ext>
+    </p:extLst>
+  </p:cSld>
+  <p:clrMapOvr>
+    <a:masterClrMapping/>
+  </p:clrMapOvr>
+  <p:transition spd="med"/>
+</p:sld>
+</file>
+
+<file path=ppt/slides/slide72.xml><?xml version="1.0" encoding="utf-8"?>
+<p:sld xmlns:a="http://schemas.openxmlformats.org/drawingml/2006/main" xmlns:r="http://schemas.openxmlformats.org/officeDocument/2006/relationships" xmlns:p="http://schemas.openxmlformats.org/presentationml/2006/main">
+  <p:cSld>
+    <p:spTree>
+      <p:nvGrpSpPr>
+        <p:cNvPr id="1" name=""/>
+        <p:cNvGrpSpPr/>
+        <p:nvPr/>
+      </p:nvGrpSpPr>
+      <p:grpSpPr>
+        <a:xfrm>
+          <a:off x="0" y="0"/>
+          <a:ext cx="0" cy="0"/>
+          <a:chOff x="0" y="0"/>
+          <a:chExt cx="0" cy="0"/>
+        </a:xfrm>
+      </p:grpSpPr>
+      <p:sp>
+        <p:nvSpPr>
+          <p:cNvPr id="4" name="Título 3">
+            <a:extLst>
+              <a:ext uri="{FF2B5EF4-FFF2-40B4-BE49-F238E27FC236}">
+                <a16:creationId xmlns:a16="http://schemas.microsoft.com/office/drawing/2014/main" id="{8A4C52A0-42D9-47BB-966A-7FE92FDBFA2D}"/>
+              </a:ext>
+            </a:extLst>
+          </p:cNvPr>
+          <p:cNvSpPr>
+            <a:spLocks noGrp="1"/>
+          </p:cNvSpPr>
+          <p:nvPr>
+            <p:ph type="title"/>
+          </p:nvPr>
+        </p:nvSpPr>
+        <p:spPr/>
+        <p:txBody>
+          <a:bodyPr>
+            <a:normAutofit/>
+          </a:bodyPr>
+          <a:lstStyle/>
+          <a:p>
+            <a:r>
+              <a:rPr lang="pt-BR" dirty="0"/>
+              <a:t>Onde usar?</a:t>
+            </a:r>
+          </a:p>
+        </p:txBody>
+      </p:sp>
+      <p:sp>
+        <p:nvSpPr>
+          <p:cNvPr id="5" name="Espaço Reservado para Conteúdo 4">
+            <a:extLst>
+              <a:ext uri="{FF2B5EF4-FFF2-40B4-BE49-F238E27FC236}">
+                <a16:creationId xmlns:a16="http://schemas.microsoft.com/office/drawing/2014/main" id="{1FBD8255-54D1-42B3-9B71-2D45D227E6FC}"/>
+              </a:ext>
+            </a:extLst>
+          </p:cNvPr>
+          <p:cNvSpPr>
+            <a:spLocks noGrp="1"/>
+          </p:cNvSpPr>
+          <p:nvPr>
+            <p:ph type="body" idx="1"/>
+          </p:nvPr>
+        </p:nvSpPr>
+        <p:spPr>
+          <a:xfrm>
+            <a:off x="1689100" y="2604530"/>
+            <a:ext cx="21005800" cy="10609446"/>
+          </a:xfrm>
+          <a:solidFill>
+            <a:schemeClr val="bg1"/>
+          </a:solidFill>
+        </p:spPr>
+        <p:txBody>
+          <a:bodyPr>
+            <a:noAutofit/>
+          </a:bodyPr>
+          <a:lstStyle/>
+          <a:p>
+            <a:pPr>
+              <a:buSzPct val="100000"/>
+            </a:pPr>
+            <a:r>
+              <a:rPr lang="pt-BR" sz="4000" dirty="0">
+                <a:cs typeface="Courier New" panose="02070309020205020404" pitchFamily="49" charset="0"/>
+              </a:rPr>
+              <a:t>É preciso ficar claro que a premissa do Java não é a de criar sistemas pequenos, onde temos um ou dois desenvolvedores, mais rapidamente que linguagens como PHP, Perl, e outras.</a:t>
+            </a:r>
+          </a:p>
+          <a:p>
+            <a:pPr>
+              <a:buSzPct val="100000"/>
+            </a:pPr>
+            <a:r>
+              <a:rPr lang="pt-BR" sz="4000" dirty="0">
+                <a:cs typeface="Courier New" panose="02070309020205020404" pitchFamily="49" charset="0"/>
+              </a:rPr>
+              <a:t>O foco da plataforma é outro: aplicações de médio a grande porte, onde o time de desenvolvedores tem várias pessoas e sempre pode vir a mudar e crescer.</a:t>
+            </a:r>
+          </a:p>
+          <a:p>
+            <a:pPr>
+              <a:buSzPct val="100000"/>
+            </a:pPr>
+            <a:r>
+              <a:rPr lang="pt-BR" sz="4000" dirty="0">
+                <a:cs typeface="Courier New" panose="02070309020205020404" pitchFamily="49" charset="0"/>
+              </a:rPr>
+              <a:t>Não tenha dúvidas que criar a primeira versão de uma aplicação usando Java, mesmo utilizando </a:t>
+            </a:r>
+            <a:r>
+              <a:rPr lang="pt-BR" sz="4000" dirty="0" err="1">
+                <a:cs typeface="Courier New" panose="02070309020205020404" pitchFamily="49" charset="0"/>
+              </a:rPr>
+              <a:t>IDEs</a:t>
+            </a:r>
+            <a:r>
+              <a:rPr lang="pt-BR" sz="4000" dirty="0">
+                <a:cs typeface="Courier New" panose="02070309020205020404" pitchFamily="49" charset="0"/>
+              </a:rPr>
+              <a:t> e ferramentas poderosas, será mais trabalhoso que muitas linguagens script ou de alta produtividade. Porém, com uma linguagem orientada a objetos e madura como o Java, será extremamente mais fácil e rápido fazer alterações no sistema, desde que você siga as boas práticas e recomendações sobre design orientado a objetos.</a:t>
+            </a:r>
+          </a:p>
+          <a:p>
+            <a:pPr>
+              <a:buSzPct val="100000"/>
+            </a:pPr>
+            <a:r>
+              <a:rPr lang="pt-BR" sz="4000" dirty="0">
+                <a:cs typeface="Courier New" panose="02070309020205020404" pitchFamily="49" charset="0"/>
+              </a:rPr>
+              <a:t>Além disso, a quantidade enorme de bibliotecas gratuitas para realizar os mais diversos trabalhos é um ponto fortíssimo para adoção do Java: você pode criar uma aplicação sofisticada, usando diversos  recursos, sem precisar comprar um componente específico, que costuma ser caro. O ecossistema do Java é enorme.</a:t>
+            </a:r>
+          </a:p>
+        </p:txBody>
+      </p:sp>
+      <p:sp>
+        <p:nvSpPr>
+          <p:cNvPr id="7" name="Espaço Reservado para Número de Slide 6">
+            <a:extLst>
+              <a:ext uri="{FF2B5EF4-FFF2-40B4-BE49-F238E27FC236}">
+                <a16:creationId xmlns:a16="http://schemas.microsoft.com/office/drawing/2014/main" id="{40C5ECBA-0615-433C-B308-162C7F749201}"/>
+              </a:ext>
+            </a:extLst>
+          </p:cNvPr>
+          <p:cNvSpPr>
+            <a:spLocks noGrp="1"/>
+          </p:cNvSpPr>
+          <p:nvPr>
+            <p:ph type="sldNum" sz="quarter" idx="10"/>
+          </p:nvPr>
+        </p:nvSpPr>
+        <p:spPr/>
+        <p:txBody>
+          <a:bodyPr/>
+          <a:lstStyle/>
+          <a:p>
+            <a:fld id="{E4B35BDD-CC3D-4492-88ED-922B282360E3}" type="slidenum">
+              <a:rPr lang="pt-BR" smtClean="0"/>
+              <a:t>72</a:t>
+            </a:fld>
+            <a:endParaRPr lang="pt-BR"/>
+          </a:p>
+        </p:txBody>
+      </p:sp>
+    </p:spTree>
+    <p:extLst>
+      <p:ext uri="{BB962C8B-B14F-4D97-AF65-F5344CB8AC3E}">
+        <p14:creationId xmlns:p14="http://schemas.microsoft.com/office/powerpoint/2010/main" val="2553264829"/>
+      </p:ext>
+    </p:extLst>
+  </p:cSld>
+  <p:clrMapOvr>
+    <a:masterClrMapping/>
+  </p:clrMapOvr>
+  <p:transition spd="med"/>
+</p:sld>
+</file>
+
+<file path=ppt/slides/slide73.xml><?xml version="1.0" encoding="utf-8"?>
+<p:sld xmlns:a="http://schemas.openxmlformats.org/drawingml/2006/main" xmlns:r="http://schemas.openxmlformats.org/officeDocument/2006/relationships" xmlns:p="http://schemas.openxmlformats.org/presentationml/2006/main">
+  <p:cSld>
+    <p:spTree>
+      <p:nvGrpSpPr>
+        <p:cNvPr id="1" name=""/>
+        <p:cNvGrpSpPr/>
+        <p:nvPr/>
+      </p:nvGrpSpPr>
+      <p:grpSpPr>
+        <a:xfrm>
+          <a:off x="0" y="0"/>
+          <a:ext cx="0" cy="0"/>
+          <a:chOff x="0" y="0"/>
+          <a:chExt cx="0" cy="0"/>
+        </a:xfrm>
+      </p:grpSpPr>
+      <p:sp>
+        <p:nvSpPr>
+          <p:cNvPr id="4" name="Título 3">
+            <a:extLst>
+              <a:ext uri="{FF2B5EF4-FFF2-40B4-BE49-F238E27FC236}">
+                <a16:creationId xmlns:a16="http://schemas.microsoft.com/office/drawing/2014/main" id="{8A4C52A0-42D9-47BB-966A-7FE92FDBFA2D}"/>
+              </a:ext>
+            </a:extLst>
+          </p:cNvPr>
+          <p:cNvSpPr>
+            <a:spLocks noGrp="1"/>
+          </p:cNvSpPr>
+          <p:nvPr>
+            <p:ph type="title"/>
+          </p:nvPr>
+        </p:nvSpPr>
+        <p:spPr/>
+        <p:txBody>
+          <a:bodyPr>
+            <a:normAutofit/>
+          </a:bodyPr>
+          <a:lstStyle/>
+          <a:p>
+            <a:r>
+              <a:rPr lang="pt-BR" dirty="0"/>
+              <a:t>Onde usar?</a:t>
+            </a:r>
+          </a:p>
+        </p:txBody>
+      </p:sp>
+      <p:sp>
+        <p:nvSpPr>
+          <p:cNvPr id="5" name="Espaço Reservado para Conteúdo 4">
+            <a:extLst>
+              <a:ext uri="{FF2B5EF4-FFF2-40B4-BE49-F238E27FC236}">
+                <a16:creationId xmlns:a16="http://schemas.microsoft.com/office/drawing/2014/main" id="{1FBD8255-54D1-42B3-9B71-2D45D227E6FC}"/>
+              </a:ext>
+            </a:extLst>
+          </p:cNvPr>
+          <p:cNvSpPr>
+            <a:spLocks noGrp="1"/>
+          </p:cNvSpPr>
+          <p:nvPr>
+            <p:ph type="body" idx="1"/>
+          </p:nvPr>
+        </p:nvSpPr>
+        <p:spPr>
+          <a:xfrm>
+            <a:off x="1689100" y="2604530"/>
+            <a:ext cx="21005800" cy="10609446"/>
+          </a:xfrm>
+          <a:solidFill>
+            <a:schemeClr val="bg1"/>
+          </a:solidFill>
+        </p:spPr>
+        <p:txBody>
+          <a:bodyPr>
+            <a:noAutofit/>
+          </a:bodyPr>
+          <a:lstStyle/>
+          <a:p>
+            <a:pPr>
+              <a:buSzPct val="100000"/>
+            </a:pPr>
+            <a:r>
+              <a:rPr lang="pt-BR" sz="4000" dirty="0">
+                <a:cs typeface="Courier New" panose="02070309020205020404" pitchFamily="49" charset="0"/>
+              </a:rPr>
+              <a:t>Cada linguagem tem seu espaço e seu melhor uso. O uso do Java é interessante em aplicações que virão a crescer, em que a legibilidade do código é importante, onde temos muita conectividade e se há muitas plataformas (ambientes e sistemas operacionais) heterogêneas (Linux, Unix, OSX e Windows misturados).</a:t>
+            </a:r>
+          </a:p>
+          <a:p>
+            <a:pPr>
+              <a:buSzPct val="100000"/>
+            </a:pPr>
+            <a:r>
+              <a:rPr lang="pt-BR" sz="4000" dirty="0">
+                <a:cs typeface="Courier New" panose="02070309020205020404" pitchFamily="49" charset="0"/>
+              </a:rPr>
+              <a:t>Você pode ver isso pela quantidade enorme de ofertas de emprego procurando desenvolvedores Java para trabalhar com sistemas web e aplicações de integração no servidor.</a:t>
+            </a:r>
+          </a:p>
+        </p:txBody>
+      </p:sp>
+      <p:sp>
+        <p:nvSpPr>
+          <p:cNvPr id="7" name="Espaço Reservado para Número de Slide 6">
+            <a:extLst>
+              <a:ext uri="{FF2B5EF4-FFF2-40B4-BE49-F238E27FC236}">
+                <a16:creationId xmlns:a16="http://schemas.microsoft.com/office/drawing/2014/main" id="{40C5ECBA-0615-433C-B308-162C7F749201}"/>
+              </a:ext>
+            </a:extLst>
+          </p:cNvPr>
+          <p:cNvSpPr>
+            <a:spLocks noGrp="1"/>
+          </p:cNvSpPr>
+          <p:nvPr>
+            <p:ph type="sldNum" sz="quarter" idx="10"/>
+          </p:nvPr>
+        </p:nvSpPr>
+        <p:spPr/>
+        <p:txBody>
+          <a:bodyPr/>
+          <a:lstStyle/>
+          <a:p>
+            <a:fld id="{E4B35BDD-CC3D-4492-88ED-922B282360E3}" type="slidenum">
+              <a:rPr lang="pt-BR" smtClean="0"/>
+              <a:t>73</a:t>
+            </a:fld>
+            <a:endParaRPr lang="pt-BR"/>
+          </a:p>
+        </p:txBody>
+      </p:sp>
+    </p:spTree>
+    <p:extLst>
+      <p:ext uri="{BB962C8B-B14F-4D97-AF65-F5344CB8AC3E}">
+        <p14:creationId xmlns:p14="http://schemas.microsoft.com/office/powerpoint/2010/main" val="4114922089"/>
+      </p:ext>
+    </p:extLst>
+  </p:cSld>
+  <p:clrMapOvr>
+    <a:masterClrMapping/>
+  </p:clrMapOvr>
+  <p:transition spd="med"/>
+</p:sld>
+</file>
+
+<file path=ppt/slides/slide74.xml><?xml version="1.0" encoding="utf-8"?>
+<p:sld xmlns:a="http://schemas.openxmlformats.org/drawingml/2006/main" xmlns:r="http://schemas.openxmlformats.org/officeDocument/2006/relationships" xmlns:p="http://schemas.openxmlformats.org/presentationml/2006/main">
+  <p:cSld>
+    <p:spTree>
+      <p:nvGrpSpPr>
+        <p:cNvPr id="1" name=""/>
+        <p:cNvGrpSpPr/>
+        <p:nvPr/>
+      </p:nvGrpSpPr>
+      <p:grpSpPr>
+        <a:xfrm>
+          <a:off x="0" y="0"/>
+          <a:ext cx="0" cy="0"/>
+          <a:chOff x="0" y="0"/>
+          <a:chExt cx="0" cy="0"/>
+        </a:xfrm>
+      </p:grpSpPr>
+      <p:pic>
+        <p:nvPicPr>
+          <p:cNvPr id="127" name="PPT_graduação_contracapa.png" descr="PPT_graduação_contracapa.png"/>
+          <p:cNvPicPr>
+            <a:picLocks noChangeAspect="1"/>
+          </p:cNvPicPr>
+          <p:nvPr/>
+        </p:nvPicPr>
+        <p:blipFill>
+          <a:blip r:embed="rId2"/>
+          <a:stretch>
+            <a:fillRect/>
+          </a:stretch>
+        </p:blipFill>
+        <p:spPr>
+          <a:xfrm>
+            <a:off x="0" y="0"/>
+            <a:ext cx="24384000" cy="13716000"/>
+          </a:xfrm>
+          <a:prstGeom prst="rect">
+            <a:avLst/>
+          </a:prstGeom>
+          <a:ln w="12700">
+            <a:miter lim="400000"/>
+          </a:ln>
+        </p:spPr>
+      </p:pic>
+      <p:sp>
+        <p:nvSpPr>
+          <p:cNvPr id="3" name="CaixaDeTexto 2"/>
+          <p:cNvSpPr txBox="1"/>
+          <p:nvPr/>
+        </p:nvSpPr>
+        <p:spPr>
+          <a:xfrm>
+            <a:off x="2160971" y="11172650"/>
+            <a:ext cx="5681043" cy="1456809"/>
+          </a:xfrm>
+          <a:prstGeom prst="rect">
+            <a:avLst/>
+          </a:prstGeom>
+          <a:noFill/>
+          <a:ln w="12700" cap="flat">
+            <a:noFill/>
+            <a:miter lim="400000"/>
+          </a:ln>
+          <a:effectLst/>
+          <a:sp3d/>
+        </p:spPr>
+        <p:style>
+          <a:lnRef idx="0">
+            <a:scrgbClr r="0" g="0" b="0"/>
+          </a:lnRef>
+          <a:fillRef idx="0">
+            <a:scrgbClr r="0" g="0" b="0"/>
+          </a:fillRef>
+          <a:effectRef idx="0">
+            <a:scrgbClr r="0" g="0" b="0"/>
+          </a:effectRef>
+          <a:fontRef idx="none"/>
+        </p:style>
+        <p:txBody>
+          <a:bodyPr rot="0" spcFirstLastPara="1" vertOverflow="overflow" horzOverflow="overflow" vert="horz" wrap="none" lIns="50800" tIns="50800" rIns="50800" bIns="50800" numCol="1" spcCol="38100" rtlCol="0" anchor="ctr">
+            <a:spAutoFit/>
+          </a:bodyPr>
+          <a:lstStyle/>
+          <a:p>
+            <a:pPr marL="0" marR="0" indent="0" algn="ctr" defTabSz="825500" rtl="0" fontAlgn="auto" latinLnBrk="0" hangingPunct="0">
+              <a:lnSpc>
+                <a:spcPct val="100000"/>
+              </a:lnSpc>
+              <a:spcBef>
+                <a:spcPts val="0"/>
+              </a:spcBef>
+              <a:spcAft>
+                <a:spcPts val="0"/>
+              </a:spcAft>
+              <a:buClrTx/>
+              <a:buSzTx/>
+              <a:buFontTx/>
+              <a:buNone/>
+              <a:tabLst/>
+            </a:pPr>
+            <a:r>
+              <a:rPr kumimoji="0" lang="pt-BR" sz="8800" b="1" i="0" u="none" strike="noStrike" cap="none" spc="0" normalizeH="0" baseline="0" dirty="0">
+                <a:ln>
+                  <a:noFill/>
+                </a:ln>
+                <a:solidFill>
+                  <a:schemeClr val="bg2">
+                    <a:lumMod val="50000"/>
+                  </a:schemeClr>
+                </a:solidFill>
+                <a:effectLst/>
+                <a:uFillTx/>
+                <a:latin typeface="Calibri" panose="020F0502020204030204" pitchFamily="34" charset="0"/>
+                <a:cs typeface="Calibri" panose="020F0502020204030204" pitchFamily="34" charset="0"/>
+                <a:sym typeface="Helvetica Neue"/>
+              </a:rPr>
+              <a:t>OBRIGADO!</a:t>
+            </a:r>
+          </a:p>
+        </p:txBody>
+      </p:sp>
+    </p:spTree>
   </p:cSld>
   <p:clrMapOvr>
     <a:masterClrMapping/>
@@ -24673,6 +28137,12 @@
 </file>
 
 <file path=customXml/item1.xml><?xml version="1.0" encoding="utf-8"?>
+<p:properties xmlns:p="http://schemas.microsoft.com/office/2006/metadata/properties" xmlns:xsi="http://www.w3.org/2001/XMLSchema-instance" xmlns:pc="http://schemas.microsoft.com/office/infopath/2007/PartnerControls">
+  <documentManagement/>
+</p:properties>
+</file>
+
+<file path=customXml/item2.xml><?xml version="1.0" encoding="utf-8"?>
 <?mso-contentType ?>
 <FormTemplates xmlns="http://schemas.microsoft.com/sharepoint/v3/contenttype/forms">
   <Display>DocumentLibraryForm</Display>
@@ -24681,7 +28151,7 @@
 </FormTemplates>
 </file>
 
-<file path=customXml/item2.xml><?xml version="1.0" encoding="utf-8"?>
+<file path=customXml/item3.xml><?xml version="1.0" encoding="utf-8"?>
 <ct:contentTypeSchema xmlns:ct="http://schemas.microsoft.com/office/2006/metadata/contentType" xmlns:ma="http://schemas.microsoft.com/office/2006/metadata/properties/metaAttributes" ct:_="" ma:_="" ma:contentTypeName="Documento" ma:contentTypeID="0x0101009FAC1FADC71DC641B1C88EDCA8A738BD" ma:contentTypeVersion="9" ma:contentTypeDescription="Crie um novo documento." ma:contentTypeScope="" ma:versionID="b2ba5c05f7feb583484f3d330bfd4d41">
   <xsd:schema xmlns:xsd="http://www.w3.org/2001/XMLSchema" xmlns:xs="http://www.w3.org/2001/XMLSchema" xmlns:p="http://schemas.microsoft.com/office/2006/metadata/properties" xmlns:ns2="4620a0fb-8c8e-452c-99f9-831cb1282a4d" xmlns:ns3="d2b67046-0f4f-4fd2-9a89-c98ef0fc6e42" targetNamespace="http://schemas.microsoft.com/office/2006/metadata/properties" ma:root="true" ma:fieldsID="450c8be9e95e4e1adec287857fc41ebe" ns2:_="" ns3:_="">
     <xsd:import namespace="4620a0fb-8c8e-452c-99f9-831cb1282a4d"/>
@@ -24878,13 +28348,24 @@
 </ct:contentTypeSchema>
 </file>
 
-<file path=customXml/item3.xml><?xml version="1.0" encoding="utf-8"?>
-<p:properties xmlns:p="http://schemas.microsoft.com/office/2006/metadata/properties" xmlns:xsi="http://www.w3.org/2001/XMLSchema-instance" xmlns:pc="http://schemas.microsoft.com/office/infopath/2007/PartnerControls">
-  <documentManagement/>
-</p:properties>
+<file path=customXml/itemProps1.xml><?xml version="1.0" encoding="utf-8"?>
+<ds:datastoreItem xmlns:ds="http://schemas.openxmlformats.org/officeDocument/2006/customXml" ds:itemID="{012B0F66-32D8-4318-9FAE-9EACF69D7379}">
+  <ds:schemaRefs>
+    <ds:schemaRef ds:uri="http://purl.org/dc/elements/1.1/"/>
+    <ds:schemaRef ds:uri="http://purl.org/dc/terms/"/>
+    <ds:schemaRef ds:uri="http://schemas.microsoft.com/office/infopath/2007/PartnerControls"/>
+    <ds:schemaRef ds:uri="http://purl.org/dc/dcmitype/"/>
+    <ds:schemaRef ds:uri="d2b67046-0f4f-4fd2-9a89-c98ef0fc6e42"/>
+    <ds:schemaRef ds:uri="http://schemas.microsoft.com/office/2006/metadata/properties"/>
+    <ds:schemaRef ds:uri="http://schemas.microsoft.com/office/2006/documentManagement/types"/>
+    <ds:schemaRef ds:uri="http://schemas.openxmlformats.org/package/2006/metadata/core-properties"/>
+    <ds:schemaRef ds:uri="4620a0fb-8c8e-452c-99f9-831cb1282a4d"/>
+    <ds:schemaRef ds:uri="http://www.w3.org/XML/1998/namespace"/>
+  </ds:schemaRefs>
+</ds:datastoreItem>
 </file>
 
-<file path=customXml/itemProps1.xml><?xml version="1.0" encoding="utf-8"?>
+<file path=customXml/itemProps2.xml><?xml version="1.0" encoding="utf-8"?>
 <ds:datastoreItem xmlns:ds="http://schemas.openxmlformats.org/officeDocument/2006/customXml" ds:itemID="{A5A8ECF9-7567-461A-B635-D7A1660AA25D}">
   <ds:schemaRefs>
     <ds:schemaRef ds:uri="http://schemas.microsoft.com/sharepoint/v3/contenttype/forms"/>
@@ -24892,7 +28373,7 @@
 </ds:datastoreItem>
 </file>
 
-<file path=customXml/itemProps2.xml><?xml version="1.0" encoding="utf-8"?>
+<file path=customXml/itemProps3.xml><?xml version="1.0" encoding="utf-8"?>
 <ds:datastoreItem xmlns:ds="http://schemas.openxmlformats.org/officeDocument/2006/customXml" ds:itemID="{9442B401-7F53-433D-B941-B748B6AF5CFA}">
   <ds:schemaRefs>
     <ds:schemaRef ds:uri="http://schemas.microsoft.com/office/2006/metadata/contentType"/>
@@ -24909,21 +28390,4 @@
     <ds:schemaRef ds:uri="http://schemas.microsoft.com/internal/obd"/>
   </ds:schemaRefs>
 </ds:datastoreItem>
-</file>
-
-<file path=customXml/itemProps3.xml><?xml version="1.0" encoding="utf-8"?>
-<ds:datastoreItem xmlns:ds="http://schemas.openxmlformats.org/officeDocument/2006/customXml" ds:itemID="{012B0F66-32D8-4318-9FAE-9EACF69D7379}">
-  <ds:schemaRefs>
-    <ds:schemaRef ds:uri="http://purl.org/dc/elements/1.1/"/>
-    <ds:schemaRef ds:uri="http://purl.org/dc/terms/"/>
-    <ds:schemaRef ds:uri="http://schemas.microsoft.com/office/infopath/2007/PartnerControls"/>
-    <ds:schemaRef ds:uri="http://purl.org/dc/dcmitype/"/>
-    <ds:schemaRef ds:uri="d2b67046-0f4f-4fd2-9a89-c98ef0fc6e42"/>
-    <ds:schemaRef ds:uri="http://schemas.microsoft.com/office/2006/metadata/properties"/>
-    <ds:schemaRef ds:uri="http://schemas.microsoft.com/office/2006/documentManagement/types"/>
-    <ds:schemaRef ds:uri="http://schemas.openxmlformats.org/package/2006/metadata/core-properties"/>
-    <ds:schemaRef ds:uri="4620a0fb-8c8e-452c-99f9-831cb1282a4d"/>
-    <ds:schemaRef ds:uri="http://www.w3.org/XML/1998/namespace"/>
-  </ds:schemaRefs>
-</ds:datastoreItem>
 </file>
</xml_diff>